<commit_message>
upload fundamental cyber security
</commit_message>
<xml_diff>
--- a/Modul/Red Team/Ethical Hacking/Ethical Hacking.pptx
+++ b/Modul/Red Team/Ethical Hacking/Ethical Hacking.pptx
@@ -1,104 +1,47 @@
 
 <file path=ppt/presentation.xml><?xml version="1.0" encoding="utf-8"?>
-<p:presentation xmlns:a="http://schemas.openxmlformats.org/drawingml/2006/main" xmlns:r="http://schemas.openxmlformats.org/officeDocument/2006/relationships" xmlns:p="http://schemas.openxmlformats.org/presentationml/2006/main" saveSubsetFonts="1" embedTrueTypeFonts="true">
+<p:presentation xmlns:a="http://schemas.openxmlformats.org/drawingml/2006/main" xmlns:r="http://schemas.openxmlformats.org/officeDocument/2006/relationships" xmlns:p="http://schemas.openxmlformats.org/presentationml/2006/main" embedTrueTypeFonts="1" saveSubsetFonts="1">
   <p:sldMasterIdLst>
     <p:sldMasterId id="2147483648" r:id="rId1"/>
   </p:sldMasterIdLst>
   <p:sldIdLst>
-    <p:sldId id="256" r:id="rId27"/>
-    <p:sldId id="257" r:id="rId28"/>
-    <p:sldId id="258" r:id="rId29"/>
-    <p:sldId id="259" r:id="rId30"/>
-    <p:sldId id="260" r:id="rId31"/>
-    <p:sldId id="261" r:id="rId32"/>
-    <p:sldId id="262" r:id="rId33"/>
+    <p:sldId id="256" r:id="rId2"/>
+    <p:sldId id="257" r:id="rId3"/>
+    <p:sldId id="258" r:id="rId4"/>
+    <p:sldId id="259" r:id="rId5"/>
+    <p:sldId id="260" r:id="rId6"/>
+    <p:sldId id="261" r:id="rId7"/>
+    <p:sldId id="262" r:id="rId8"/>
   </p:sldIdLst>
   <p:sldSz cx="18288000" cy="10287000"/>
   <p:notesSz cx="6858000" cy="9144000"/>
   <p:embeddedFontLst>
     <p:embeddedFont>
-      <p:font typeface="Arimo" charset="1" panose="020B0604020202020204"/>
-      <p:regular r:id="rId6"/>
+      <p:font typeface="Calibri" panose="020F0502020204030204" pitchFamily="34" charset="0"/>
+      <p:regular r:id="rId9"/>
+      <p:bold r:id="rId10"/>
+      <p:italic r:id="rId11"/>
+      <p:boldItalic r:id="rId12"/>
     </p:embeddedFont>
     <p:embeddedFont>
-      <p:font typeface="Arimo Bold" charset="1" panose="020B0704020202020204"/>
-      <p:regular r:id="rId7"/>
-    </p:embeddedFont>
-    <p:embeddedFont>
-      <p:font typeface="Arimo Italics" charset="1" panose="020B0604020202090204"/>
-      <p:regular r:id="rId8"/>
-    </p:embeddedFont>
-    <p:embeddedFont>
-      <p:font typeface="Arimo Bold Italics" charset="1" panose="020B0704020202090204"/>
-      <p:regular r:id="rId9"/>
-    </p:embeddedFont>
-    <p:embeddedFont>
-      <p:font typeface="DM Serif Display" charset="1" panose="00000000000000000000"/>
-      <p:regular r:id="rId10"/>
-    </p:embeddedFont>
-    <p:embeddedFont>
-      <p:font typeface="DM Serif Display Italics" charset="1" panose="00000000000000000000"/>
-      <p:regular r:id="rId11"/>
-    </p:embeddedFont>
-    <p:embeddedFont>
-      <p:font typeface="Garet" charset="1" panose="00000000000000000000"/>
-      <p:regular r:id="rId12"/>
-    </p:embeddedFont>
-    <p:embeddedFont>
-      <p:font typeface="Garet Bold" charset="1" panose="00000000000000000000"/>
+      <p:font typeface="Canva Sans" panose="020B0604020202020204" charset="0"/>
       <p:regular r:id="rId13"/>
     </p:embeddedFont>
     <p:embeddedFont>
-      <p:font typeface="Garet Italics" charset="1" panose="00000000000000000000"/>
+      <p:font typeface="Canva Sans Bold" panose="020B0604020202020204" charset="0"/>
       <p:regular r:id="rId14"/>
     </p:embeddedFont>
     <p:embeddedFont>
-      <p:font typeface="Garet Bold Italics" charset="1" panose="00000000000000000000"/>
+      <p:font typeface="DM Serif Display" pitchFamily="2" charset="0"/>
       <p:regular r:id="rId15"/>
     </p:embeddedFont>
     <p:embeddedFont>
-      <p:font typeface="Garet Light" charset="1" panose="00000000000000000000"/>
+      <p:font typeface="Garet" panose="020B0604020202020204" charset="0"/>
       <p:regular r:id="rId16"/>
     </p:embeddedFont>
     <p:embeddedFont>
-      <p:font typeface="Garet Ultra-Bold" charset="1" panose="00000000000000000000"/>
+      <p:font typeface="Garet Bold" panose="020B0604020202020204" charset="0"/>
       <p:regular r:id="rId17"/>
-    </p:embeddedFont>
-    <p:embeddedFont>
-      <p:font typeface="Garet Ultra-Bold Italics" charset="1" panose="00000000000000000000"/>
-      <p:regular r:id="rId18"/>
-    </p:embeddedFont>
-    <p:embeddedFont>
-      <p:font typeface="Garet Heavy" charset="1" panose="00000000000000000000"/>
-      <p:regular r:id="rId19"/>
-    </p:embeddedFont>
-    <p:embeddedFont>
-      <p:font typeface="Garet Heavy Italics" charset="1" panose="00000000000000000000"/>
-      <p:regular r:id="rId20"/>
-    </p:embeddedFont>
-    <p:embeddedFont>
-      <p:font typeface="Canva Sans" charset="1" panose="020B0503030501040103"/>
-      <p:regular r:id="rId21"/>
-    </p:embeddedFont>
-    <p:embeddedFont>
-      <p:font typeface="Canva Sans Bold" charset="1" panose="020B0803030501040103"/>
-      <p:regular r:id="rId22"/>
-    </p:embeddedFont>
-    <p:embeddedFont>
-      <p:font typeface="Canva Sans Italics" charset="1" panose="020B0503030501040103"/>
-      <p:regular r:id="rId23"/>
-    </p:embeddedFont>
-    <p:embeddedFont>
-      <p:font typeface="Canva Sans Bold Italics" charset="1" panose="020B0803030501040103"/>
-      <p:regular r:id="rId24"/>
-    </p:embeddedFont>
-    <p:embeddedFont>
-      <p:font typeface="Canva Sans Medium" charset="1" panose="020B0603030501040103"/>
-      <p:regular r:id="rId25"/>
-    </p:embeddedFont>
-    <p:embeddedFont>
-      <p:font typeface="Canva Sans Medium Italics" charset="1" panose="020B0603030501040103"/>
-      <p:regular r:id="rId26"/>
     </p:embeddedFont>
   </p:embeddedFontLst>
   <p:defaultTextStyle>
@@ -196,6 +139,22 @@
       </a:defRPr>
     </a:lvl9pPr>
   </p:defaultTextStyle>
+  <p:extLst>
+    <p:ext uri="{EFAFB233-063F-42B5-8137-9DF3F51BA10A}">
+      <p15:sldGuideLst xmlns:p15="http://schemas.microsoft.com/office/powerpoint/2012/main">
+        <p15:guide id="1" orient="horz" pos="2160">
+          <p15:clr>
+            <a:srgbClr val="A4A3A4"/>
+          </p15:clr>
+        </p15:guide>
+        <p15:guide id="2" pos="2880">
+          <p15:clr>
+            <a:srgbClr val="A4A3A4"/>
+          </p15:clr>
+        </p15:guide>
+      </p15:sldGuideLst>
+    </p:ext>
+  </p:extLst>
 </p:presentation>
 </file>
 
@@ -237,10 +196,9 @@
           <a:lstStyle/>
           <a:p>
             <a:r>
-              <a:rPr lang="en-US" smtClean="0"/>
+              <a:rPr lang="en-US"/>
               <a:t>Click to edit Master title style</a:t>
             </a:r>
-            <a:endParaRPr lang="en-US"/>
           </a:p>
         </p:txBody>
       </p:sp>
@@ -356,10 +314,9 @@
           </a:lstStyle>
           <a:p>
             <a:r>
-              <a:rPr lang="en-US" smtClean="0"/>
+              <a:rPr lang="en-US"/>
               <a:t>Click to edit Master subtitle style</a:t>
             </a:r>
-            <a:endParaRPr lang="en-US"/>
           </a:p>
         </p:txBody>
       </p:sp>
@@ -381,7 +338,7 @@
             <a:fld id="{1D8BD707-D9CF-40AE-B4C6-C98DA3205C09}" type="datetimeFigureOut">
               <a:rPr lang="en-US" smtClean="0"/>
               <a:pPr/>
-              <a:t>8/1/2011</a:t>
+              <a:t>11/1/2023</a:t>
             </a:fld>
             <a:endParaRPr lang="en-US"/>
           </a:p>
@@ -471,10 +428,9 @@
           <a:lstStyle/>
           <a:p>
             <a:r>
-              <a:rPr lang="en-US" smtClean="0"/>
+              <a:rPr lang="en-US"/>
               <a:t>Click to edit Master title style</a:t>
             </a:r>
-            <a:endParaRPr lang="en-US"/>
           </a:p>
         </p:txBody>
       </p:sp>
@@ -495,38 +451,37 @@
           <a:p>
             <a:pPr lvl="0"/>
             <a:r>
-              <a:rPr lang="en-US" smtClean="0"/>
+              <a:rPr lang="en-US"/>
               <a:t>Click to edit Master text styles</a:t>
             </a:r>
           </a:p>
           <a:p>
             <a:pPr lvl="1"/>
             <a:r>
-              <a:rPr lang="en-US" smtClean="0"/>
+              <a:rPr lang="en-US"/>
               <a:t>Second level</a:t>
             </a:r>
           </a:p>
           <a:p>
             <a:pPr lvl="2"/>
             <a:r>
-              <a:rPr lang="en-US" smtClean="0"/>
+              <a:rPr lang="en-US"/>
               <a:t>Third level</a:t>
             </a:r>
           </a:p>
           <a:p>
             <a:pPr lvl="3"/>
             <a:r>
-              <a:rPr lang="en-US" smtClean="0"/>
+              <a:rPr lang="en-US"/>
               <a:t>Fourth level</a:t>
             </a:r>
           </a:p>
           <a:p>
             <a:pPr lvl="4"/>
             <a:r>
-              <a:rPr lang="en-US" smtClean="0"/>
+              <a:rPr lang="en-US"/>
               <a:t>Fifth level</a:t>
             </a:r>
-            <a:endParaRPr lang="en-US"/>
           </a:p>
         </p:txBody>
       </p:sp>
@@ -548,7 +503,7 @@
             <a:fld id="{1D8BD707-D9CF-40AE-B4C6-C98DA3205C09}" type="datetimeFigureOut">
               <a:rPr lang="en-US" smtClean="0"/>
               <a:pPr/>
-              <a:t>8/1/2011</a:t>
+              <a:t>11/1/2023</a:t>
             </a:fld>
             <a:endParaRPr lang="en-US"/>
           </a:p>
@@ -643,10 +598,9 @@
           <a:lstStyle/>
           <a:p>
             <a:r>
-              <a:rPr lang="en-US" smtClean="0"/>
+              <a:rPr lang="en-US"/>
               <a:t>Click to edit Master title style</a:t>
             </a:r>
-            <a:endParaRPr lang="en-US"/>
           </a:p>
         </p:txBody>
       </p:sp>
@@ -672,38 +626,37 @@
           <a:p>
             <a:pPr lvl="0"/>
             <a:r>
-              <a:rPr lang="en-US" smtClean="0"/>
+              <a:rPr lang="en-US"/>
               <a:t>Click to edit Master text styles</a:t>
             </a:r>
           </a:p>
           <a:p>
             <a:pPr lvl="1"/>
             <a:r>
-              <a:rPr lang="en-US" smtClean="0"/>
+              <a:rPr lang="en-US"/>
               <a:t>Second level</a:t>
             </a:r>
           </a:p>
           <a:p>
             <a:pPr lvl="2"/>
             <a:r>
-              <a:rPr lang="en-US" smtClean="0"/>
+              <a:rPr lang="en-US"/>
               <a:t>Third level</a:t>
             </a:r>
           </a:p>
           <a:p>
             <a:pPr lvl="3"/>
             <a:r>
-              <a:rPr lang="en-US" smtClean="0"/>
+              <a:rPr lang="en-US"/>
               <a:t>Fourth level</a:t>
             </a:r>
           </a:p>
           <a:p>
             <a:pPr lvl="4"/>
             <a:r>
-              <a:rPr lang="en-US" smtClean="0"/>
+              <a:rPr lang="en-US"/>
               <a:t>Fifth level</a:t>
             </a:r>
-            <a:endParaRPr lang="en-US"/>
           </a:p>
         </p:txBody>
       </p:sp>
@@ -725,7 +678,7 @@
             <a:fld id="{1D8BD707-D9CF-40AE-B4C6-C98DA3205C09}" type="datetimeFigureOut">
               <a:rPr lang="en-US" smtClean="0"/>
               <a:pPr/>
-              <a:t>8/1/2011</a:t>
+              <a:t>11/1/2023</a:t>
             </a:fld>
             <a:endParaRPr lang="en-US"/>
           </a:p>
@@ -815,10 +768,9 @@
           <a:lstStyle/>
           <a:p>
             <a:r>
-              <a:rPr lang="en-US" smtClean="0"/>
+              <a:rPr lang="en-US"/>
               <a:t>Click to edit Master title style</a:t>
             </a:r>
-            <a:endParaRPr lang="en-US"/>
           </a:p>
         </p:txBody>
       </p:sp>
@@ -839,38 +791,37 @@
           <a:p>
             <a:pPr lvl="0"/>
             <a:r>
-              <a:rPr lang="en-US" smtClean="0"/>
+              <a:rPr lang="en-US"/>
               <a:t>Click to edit Master text styles</a:t>
             </a:r>
           </a:p>
           <a:p>
             <a:pPr lvl="1"/>
             <a:r>
-              <a:rPr lang="en-US" smtClean="0"/>
+              <a:rPr lang="en-US"/>
               <a:t>Second level</a:t>
             </a:r>
           </a:p>
           <a:p>
             <a:pPr lvl="2"/>
             <a:r>
-              <a:rPr lang="en-US" smtClean="0"/>
+              <a:rPr lang="en-US"/>
               <a:t>Third level</a:t>
             </a:r>
           </a:p>
           <a:p>
             <a:pPr lvl="3"/>
             <a:r>
-              <a:rPr lang="en-US" smtClean="0"/>
+              <a:rPr lang="en-US"/>
               <a:t>Fourth level</a:t>
             </a:r>
           </a:p>
           <a:p>
             <a:pPr lvl="4"/>
             <a:r>
-              <a:rPr lang="en-US" smtClean="0"/>
+              <a:rPr lang="en-US"/>
               <a:t>Fifth level</a:t>
             </a:r>
-            <a:endParaRPr lang="en-US"/>
           </a:p>
         </p:txBody>
       </p:sp>
@@ -892,7 +843,7 @@
             <a:fld id="{1D8BD707-D9CF-40AE-B4C6-C98DA3205C09}" type="datetimeFigureOut">
               <a:rPr lang="en-US" smtClean="0"/>
               <a:pPr/>
-              <a:t>8/1/2011</a:t>
+              <a:t>11/1/2023</a:t>
             </a:fld>
             <a:endParaRPr lang="en-US"/>
           </a:p>
@@ -991,10 +942,9 @@
           </a:lstStyle>
           <a:p>
             <a:r>
-              <a:rPr lang="en-US" smtClean="0"/>
+              <a:rPr lang="en-US"/>
               <a:t>Click to edit Master title style</a:t>
             </a:r>
-            <a:endParaRPr lang="en-US"/>
           </a:p>
         </p:txBody>
       </p:sp>
@@ -1111,7 +1061,7 @@
           <a:p>
             <a:pPr lvl="0"/>
             <a:r>
-              <a:rPr lang="en-US" smtClean="0"/>
+              <a:rPr lang="en-US"/>
               <a:t>Click to edit Master text styles</a:t>
             </a:r>
           </a:p>
@@ -1135,7 +1085,7 @@
             <a:fld id="{1D8BD707-D9CF-40AE-B4C6-C98DA3205C09}" type="datetimeFigureOut">
               <a:rPr lang="en-US" smtClean="0"/>
               <a:pPr/>
-              <a:t>8/1/2011</a:t>
+              <a:t>11/1/2023</a:t>
             </a:fld>
             <a:endParaRPr lang="en-US"/>
           </a:p>
@@ -1225,10 +1175,9 @@
           <a:lstStyle/>
           <a:p>
             <a:r>
-              <a:rPr lang="en-US" smtClean="0"/>
+              <a:rPr lang="en-US"/>
               <a:t>Click to edit Master title style</a:t>
             </a:r>
-            <a:endParaRPr lang="en-US"/>
           </a:p>
         </p:txBody>
       </p:sp>
@@ -1282,38 +1231,37 @@
           <a:p>
             <a:pPr lvl="0"/>
             <a:r>
-              <a:rPr lang="en-US" smtClean="0"/>
+              <a:rPr lang="en-US"/>
               <a:t>Click to edit Master text styles</a:t>
             </a:r>
           </a:p>
           <a:p>
             <a:pPr lvl="1"/>
             <a:r>
-              <a:rPr lang="en-US" smtClean="0"/>
+              <a:rPr lang="en-US"/>
               <a:t>Second level</a:t>
             </a:r>
           </a:p>
           <a:p>
             <a:pPr lvl="2"/>
             <a:r>
-              <a:rPr lang="en-US" smtClean="0"/>
+              <a:rPr lang="en-US"/>
               <a:t>Third level</a:t>
             </a:r>
           </a:p>
           <a:p>
             <a:pPr lvl="3"/>
             <a:r>
-              <a:rPr lang="en-US" smtClean="0"/>
+              <a:rPr lang="en-US"/>
               <a:t>Fourth level</a:t>
             </a:r>
           </a:p>
           <a:p>
             <a:pPr lvl="4"/>
             <a:r>
-              <a:rPr lang="en-US" smtClean="0"/>
+              <a:rPr lang="en-US"/>
               <a:t>Fifth level</a:t>
             </a:r>
-            <a:endParaRPr lang="en-US"/>
           </a:p>
         </p:txBody>
       </p:sp>
@@ -1367,38 +1315,37 @@
           <a:p>
             <a:pPr lvl="0"/>
             <a:r>
-              <a:rPr lang="en-US" smtClean="0"/>
+              <a:rPr lang="en-US"/>
               <a:t>Click to edit Master text styles</a:t>
             </a:r>
           </a:p>
           <a:p>
             <a:pPr lvl="1"/>
             <a:r>
-              <a:rPr lang="en-US" smtClean="0"/>
+              <a:rPr lang="en-US"/>
               <a:t>Second level</a:t>
             </a:r>
           </a:p>
           <a:p>
             <a:pPr lvl="2"/>
             <a:r>
-              <a:rPr lang="en-US" smtClean="0"/>
+              <a:rPr lang="en-US"/>
               <a:t>Third level</a:t>
             </a:r>
           </a:p>
           <a:p>
             <a:pPr lvl="3"/>
             <a:r>
-              <a:rPr lang="en-US" smtClean="0"/>
+              <a:rPr lang="en-US"/>
               <a:t>Fourth level</a:t>
             </a:r>
           </a:p>
           <a:p>
             <a:pPr lvl="4"/>
             <a:r>
-              <a:rPr lang="en-US" smtClean="0"/>
+              <a:rPr lang="en-US"/>
               <a:t>Fifth level</a:t>
             </a:r>
-            <a:endParaRPr lang="en-US"/>
           </a:p>
         </p:txBody>
       </p:sp>
@@ -1420,7 +1367,7 @@
             <a:fld id="{1D8BD707-D9CF-40AE-B4C6-C98DA3205C09}" type="datetimeFigureOut">
               <a:rPr lang="en-US" smtClean="0"/>
               <a:pPr/>
-              <a:t>8/1/2011</a:t>
+              <a:t>11/1/2023</a:t>
             </a:fld>
             <a:endParaRPr lang="en-US"/>
           </a:p>
@@ -1514,10 +1461,9 @@
           </a:lstStyle>
           <a:p>
             <a:r>
-              <a:rPr lang="en-US" smtClean="0"/>
+              <a:rPr lang="en-US"/>
               <a:t>Click to edit Master title style</a:t>
             </a:r>
-            <a:endParaRPr lang="en-US"/>
           </a:p>
         </p:txBody>
       </p:sp>
@@ -1580,7 +1526,7 @@
           <a:p>
             <a:pPr lvl="0"/>
             <a:r>
-              <a:rPr lang="en-US" smtClean="0"/>
+              <a:rPr lang="en-US"/>
               <a:t>Click to edit Master text styles</a:t>
             </a:r>
           </a:p>
@@ -1636,38 +1582,37 @@
           <a:p>
             <a:pPr lvl="0"/>
             <a:r>
-              <a:rPr lang="en-US" smtClean="0"/>
+              <a:rPr lang="en-US"/>
               <a:t>Click to edit Master text styles</a:t>
             </a:r>
           </a:p>
           <a:p>
             <a:pPr lvl="1"/>
             <a:r>
-              <a:rPr lang="en-US" smtClean="0"/>
+              <a:rPr lang="en-US"/>
               <a:t>Second level</a:t>
             </a:r>
           </a:p>
           <a:p>
             <a:pPr lvl="2"/>
             <a:r>
-              <a:rPr lang="en-US" smtClean="0"/>
+              <a:rPr lang="en-US"/>
               <a:t>Third level</a:t>
             </a:r>
           </a:p>
           <a:p>
             <a:pPr lvl="3"/>
             <a:r>
-              <a:rPr lang="en-US" smtClean="0"/>
+              <a:rPr lang="en-US"/>
               <a:t>Fourth level</a:t>
             </a:r>
           </a:p>
           <a:p>
             <a:pPr lvl="4"/>
             <a:r>
-              <a:rPr lang="en-US" smtClean="0"/>
+              <a:rPr lang="en-US"/>
               <a:t>Fifth level</a:t>
             </a:r>
-            <a:endParaRPr lang="en-US"/>
           </a:p>
         </p:txBody>
       </p:sp>
@@ -1730,7 +1675,7 @@
           <a:p>
             <a:pPr lvl="0"/>
             <a:r>
-              <a:rPr lang="en-US" smtClean="0"/>
+              <a:rPr lang="en-US"/>
               <a:t>Click to edit Master text styles</a:t>
             </a:r>
           </a:p>
@@ -1786,38 +1731,37 @@
           <a:p>
             <a:pPr lvl="0"/>
             <a:r>
-              <a:rPr lang="en-US" smtClean="0"/>
+              <a:rPr lang="en-US"/>
               <a:t>Click to edit Master text styles</a:t>
             </a:r>
           </a:p>
           <a:p>
             <a:pPr lvl="1"/>
             <a:r>
-              <a:rPr lang="en-US" smtClean="0"/>
+              <a:rPr lang="en-US"/>
               <a:t>Second level</a:t>
             </a:r>
           </a:p>
           <a:p>
             <a:pPr lvl="2"/>
             <a:r>
-              <a:rPr lang="en-US" smtClean="0"/>
+              <a:rPr lang="en-US"/>
               <a:t>Third level</a:t>
             </a:r>
           </a:p>
           <a:p>
             <a:pPr lvl="3"/>
             <a:r>
-              <a:rPr lang="en-US" smtClean="0"/>
+              <a:rPr lang="en-US"/>
               <a:t>Fourth level</a:t>
             </a:r>
           </a:p>
           <a:p>
             <a:pPr lvl="4"/>
             <a:r>
-              <a:rPr lang="en-US" smtClean="0"/>
+              <a:rPr lang="en-US"/>
               <a:t>Fifth level</a:t>
             </a:r>
-            <a:endParaRPr lang="en-US"/>
           </a:p>
         </p:txBody>
       </p:sp>
@@ -1839,7 +1783,7 @@
             <a:fld id="{1D8BD707-D9CF-40AE-B4C6-C98DA3205C09}" type="datetimeFigureOut">
               <a:rPr lang="en-US" smtClean="0"/>
               <a:pPr/>
-              <a:t>8/1/2011</a:t>
+              <a:t>11/1/2023</a:t>
             </a:fld>
             <a:endParaRPr lang="en-US"/>
           </a:p>
@@ -1929,10 +1873,9 @@
           <a:lstStyle/>
           <a:p>
             <a:r>
-              <a:rPr lang="en-US" smtClean="0"/>
+              <a:rPr lang="en-US"/>
               <a:t>Click to edit Master title style</a:t>
             </a:r>
-            <a:endParaRPr lang="en-US"/>
           </a:p>
         </p:txBody>
       </p:sp>
@@ -1954,7 +1897,7 @@
             <a:fld id="{1D8BD707-D9CF-40AE-B4C6-C98DA3205C09}" type="datetimeFigureOut">
               <a:rPr lang="en-US" smtClean="0"/>
               <a:pPr/>
-              <a:t>8/1/2011</a:t>
+              <a:t>11/1/2023</a:t>
             </a:fld>
             <a:endParaRPr lang="en-US"/>
           </a:p>
@@ -2046,7 +1989,7 @@
             <a:fld id="{1D8BD707-D9CF-40AE-B4C6-C98DA3205C09}" type="datetimeFigureOut">
               <a:rPr lang="en-US" smtClean="0"/>
               <a:pPr/>
-              <a:t>8/1/2011</a:t>
+              <a:t>11/1/2023</a:t>
             </a:fld>
             <a:endParaRPr lang="en-US"/>
           </a:p>
@@ -2145,10 +2088,9 @@
           </a:lstStyle>
           <a:p>
             <a:r>
-              <a:rPr lang="en-US" smtClean="0"/>
+              <a:rPr lang="en-US"/>
               <a:t>Click to edit Master title style</a:t>
             </a:r>
-            <a:endParaRPr lang="en-US"/>
           </a:p>
         </p:txBody>
       </p:sp>
@@ -2202,38 +2144,37 @@
           <a:p>
             <a:pPr lvl="0"/>
             <a:r>
-              <a:rPr lang="en-US" smtClean="0"/>
+              <a:rPr lang="en-US"/>
               <a:t>Click to edit Master text styles</a:t>
             </a:r>
           </a:p>
           <a:p>
             <a:pPr lvl="1"/>
             <a:r>
-              <a:rPr lang="en-US" smtClean="0"/>
+              <a:rPr lang="en-US"/>
               <a:t>Second level</a:t>
             </a:r>
           </a:p>
           <a:p>
             <a:pPr lvl="2"/>
             <a:r>
-              <a:rPr lang="en-US" smtClean="0"/>
+              <a:rPr lang="en-US"/>
               <a:t>Third level</a:t>
             </a:r>
           </a:p>
           <a:p>
             <a:pPr lvl="3"/>
             <a:r>
-              <a:rPr lang="en-US" smtClean="0"/>
+              <a:rPr lang="en-US"/>
               <a:t>Fourth level</a:t>
             </a:r>
           </a:p>
           <a:p>
             <a:pPr lvl="4"/>
             <a:r>
-              <a:rPr lang="en-US" smtClean="0"/>
+              <a:rPr lang="en-US"/>
               <a:t>Fifth level</a:t>
             </a:r>
-            <a:endParaRPr lang="en-US"/>
           </a:p>
         </p:txBody>
       </p:sp>
@@ -2296,7 +2237,7 @@
           <a:p>
             <a:pPr lvl="0"/>
             <a:r>
-              <a:rPr lang="en-US" smtClean="0"/>
+              <a:rPr lang="en-US"/>
               <a:t>Click to edit Master text styles</a:t>
             </a:r>
           </a:p>
@@ -2320,7 +2261,7 @@
             <a:fld id="{1D8BD707-D9CF-40AE-B4C6-C98DA3205C09}" type="datetimeFigureOut">
               <a:rPr lang="en-US" smtClean="0"/>
               <a:pPr/>
-              <a:t>8/1/2011</a:t>
+              <a:t>11/1/2023</a:t>
             </a:fld>
             <a:endParaRPr lang="en-US"/>
           </a:p>
@@ -2419,10 +2360,9 @@
           </a:lstStyle>
           <a:p>
             <a:r>
-              <a:rPr lang="en-US" smtClean="0"/>
+              <a:rPr lang="en-US"/>
               <a:t>Click to edit Master title style</a:t>
             </a:r>
-            <a:endParaRPr lang="en-US"/>
           </a:p>
         </p:txBody>
       </p:sp>
@@ -2546,7 +2486,7 @@
           <a:p>
             <a:pPr lvl="0"/>
             <a:r>
-              <a:rPr lang="en-US" smtClean="0"/>
+              <a:rPr lang="en-US"/>
               <a:t>Click to edit Master text styles</a:t>
             </a:r>
           </a:p>
@@ -2570,7 +2510,7 @@
             <a:fld id="{1D8BD707-D9CF-40AE-B4C6-C98DA3205C09}" type="datetimeFigureOut">
               <a:rPr lang="en-US" smtClean="0"/>
               <a:pPr/>
-              <a:t>8/1/2011</a:t>
+              <a:t>11/1/2023</a:t>
             </a:fld>
             <a:endParaRPr lang="en-US"/>
           </a:p>
@@ -2675,10 +2615,9 @@
           <a:lstStyle/>
           <a:p>
             <a:r>
-              <a:rPr lang="en-US" smtClean="0"/>
+              <a:rPr lang="en-US"/>
               <a:t>Click to edit Master title style</a:t>
             </a:r>
-            <a:endParaRPr lang="en-US"/>
           </a:p>
         </p:txBody>
       </p:sp>
@@ -2709,38 +2648,37 @@
           <a:p>
             <a:pPr lvl="0"/>
             <a:r>
-              <a:rPr lang="en-US" smtClean="0"/>
+              <a:rPr lang="en-US"/>
               <a:t>Click to edit Master text styles</a:t>
             </a:r>
           </a:p>
           <a:p>
             <a:pPr lvl="1"/>
             <a:r>
-              <a:rPr lang="en-US" smtClean="0"/>
+              <a:rPr lang="en-US"/>
               <a:t>Second level</a:t>
             </a:r>
           </a:p>
           <a:p>
             <a:pPr lvl="2"/>
             <a:r>
-              <a:rPr lang="en-US" smtClean="0"/>
+              <a:rPr lang="en-US"/>
               <a:t>Third level</a:t>
             </a:r>
           </a:p>
           <a:p>
             <a:pPr lvl="3"/>
             <a:r>
-              <a:rPr lang="en-US" smtClean="0"/>
+              <a:rPr lang="en-US"/>
               <a:t>Fourth level</a:t>
             </a:r>
           </a:p>
           <a:p>
             <a:pPr lvl="4"/>
             <a:r>
-              <a:rPr lang="en-US" smtClean="0"/>
+              <a:rPr lang="en-US"/>
               <a:t>Fifth level</a:t>
             </a:r>
-            <a:endParaRPr lang="en-US"/>
           </a:p>
         </p:txBody>
       </p:sp>
@@ -2780,7 +2718,7 @@
             <a:fld id="{1D8BD707-D9CF-40AE-B4C6-C98DA3205C09}" type="datetimeFigureOut">
               <a:rPr lang="en-US" smtClean="0"/>
               <a:pPr/>
-              <a:t>8/1/2011</a:t>
+              <a:t>11/1/2023</a:t>
             </a:fld>
             <a:endParaRPr lang="en-US"/>
           </a:p>
@@ -3135,13 +3073,14 @@
 </file>
 
 <file path=ppt/slides/slide1.xml><?xml version="1.0" encoding="utf-8"?>
-<p:sld xmlns:p="http://schemas.openxmlformats.org/presentationml/2006/main" xmlns:a="http://schemas.openxmlformats.org/drawingml/2006/main" xmlns:r="http://schemas.openxmlformats.org/officeDocument/2006/relationships">
+<p:sld xmlns:a="http://schemas.openxmlformats.org/drawingml/2006/main" xmlns:r="http://schemas.openxmlformats.org/officeDocument/2006/relationships" xmlns:p="http://schemas.openxmlformats.org/presentationml/2006/main">
   <p:cSld>
     <p:bg>
       <p:bgPr>
         <a:solidFill>
           <a:srgbClr val="F4F4F4"/>
         </a:solidFill>
+        <a:effectLst/>
       </p:bgPr>
     </p:bg>
     <p:spTree>
@@ -3160,12 +3099,12 @@
       </p:grpSpPr>
       <p:grpSp>
         <p:nvGrpSpPr>
-          <p:cNvPr name="Group 2" id="2"/>
+          <p:cNvPr id="2" name="Group 2"/>
           <p:cNvGrpSpPr/>
           <p:nvPr/>
         </p:nvGrpSpPr>
         <p:grpSpPr>
-          <a:xfrm rot="0">
+          <a:xfrm>
             <a:off x="11044930" y="0"/>
             <a:ext cx="7243070" cy="10622880"/>
             <a:chOff x="0" y="0"/>
@@ -3174,12 +3113,12 @@
         </p:grpSpPr>
         <p:sp>
           <p:nvSpPr>
-            <p:cNvPr name="Freeform 3" id="3"/>
+            <p:cNvPr id="3" name="Freeform 3"/>
             <p:cNvSpPr/>
             <p:nvPr/>
           </p:nvSpPr>
           <p:spPr>
-            <a:xfrm flipH="false" flipV="false" rot="0">
+            <a:xfrm>
               <a:off x="0" y="0"/>
               <a:ext cx="579439" cy="849821"/>
             </a:xfrm>
@@ -3188,9 +3127,9 @@
               <a:gdLst/>
               <a:ahLst/>
               <a:cxnLst/>
-              <a:rect r="r" b="b" t="t" l="l"/>
+              <a:rect l="l" t="t" r="r" b="b"/>
               <a:pathLst>
-                <a:path h="849821" w="579439">
+                <a:path w="579439" h="849821">
                   <a:moveTo>
                     <a:pt x="0" y="0"/>
                   </a:moveTo>
@@ -3219,8 +3158,8 @@
         </p:sp>
         <p:sp>
           <p:nvSpPr>
-            <p:cNvPr name="TextBox 4" id="4"/>
-            <p:cNvSpPr txBox="true"/>
+            <p:cNvPr id="4" name="TextBox 4"/>
+            <p:cNvSpPr txBox="1"/>
             <p:nvPr/>
           </p:nvSpPr>
           <p:spPr>
@@ -3233,7 +3172,7 @@
             </a:prstGeom>
           </p:spPr>
           <p:txBody>
-            <a:bodyPr anchor="ctr" rtlCol="false" tIns="50800" lIns="50800" bIns="50800" rIns="50800"/>
+            <a:bodyPr lIns="50800" tIns="50800" rIns="50800" bIns="50800" rtlCol="0" anchor="ctr"/>
             <a:lstStyle/>
             <a:p>
               <a:pPr algn="ctr">
@@ -3241,18 +3180,19 @@
                   <a:spcPts val="2659"/>
                 </a:lnSpc>
               </a:pPr>
+              <a:endParaRPr/>
             </a:p>
           </p:txBody>
         </p:sp>
       </p:grpSp>
       <p:grpSp>
         <p:nvGrpSpPr>
-          <p:cNvPr name="Group 5" id="5"/>
+          <p:cNvPr id="5" name="Group 5"/>
           <p:cNvGrpSpPr/>
           <p:nvPr/>
         </p:nvGrpSpPr>
         <p:grpSpPr>
-          <a:xfrm rot="0">
+          <a:xfrm>
             <a:off x="-305722" y="-167940"/>
             <a:ext cx="607099" cy="10622880"/>
             <a:chOff x="0" y="0"/>
@@ -3261,12 +3201,12 @@
         </p:grpSpPr>
         <p:sp>
           <p:nvSpPr>
-            <p:cNvPr name="Freeform 6" id="6"/>
+            <p:cNvPr id="6" name="Freeform 6"/>
             <p:cNvSpPr/>
             <p:nvPr/>
           </p:nvSpPr>
           <p:spPr>
-            <a:xfrm flipH="false" flipV="false" rot="0">
+            <a:xfrm>
               <a:off x="0" y="0"/>
               <a:ext cx="48567" cy="849821"/>
             </a:xfrm>
@@ -3275,9 +3215,9 @@
               <a:gdLst/>
               <a:ahLst/>
               <a:cxnLst/>
-              <a:rect r="r" b="b" t="t" l="l"/>
+              <a:rect l="l" t="t" r="r" b="b"/>
               <a:pathLst>
-                <a:path h="849821" w="48567">
+                <a:path w="48567" h="849821">
                   <a:moveTo>
                     <a:pt x="0" y="0"/>
                   </a:moveTo>
@@ -3306,8 +3246,8 @@
         </p:sp>
         <p:sp>
           <p:nvSpPr>
-            <p:cNvPr name="TextBox 7" id="7"/>
-            <p:cNvSpPr txBox="true"/>
+            <p:cNvPr id="7" name="TextBox 7"/>
+            <p:cNvSpPr txBox="1"/>
             <p:nvPr/>
           </p:nvSpPr>
           <p:spPr>
@@ -3320,7 +3260,7 @@
             </a:prstGeom>
           </p:spPr>
           <p:txBody>
-            <a:bodyPr anchor="ctr" rtlCol="false" tIns="50800" lIns="50800" bIns="50800" rIns="50800"/>
+            <a:bodyPr lIns="50800" tIns="50800" rIns="50800" bIns="50800" rtlCol="0" anchor="ctr"/>
             <a:lstStyle/>
             <a:p>
               <a:pPr algn="ctr">
@@ -3328,18 +3268,19 @@
                   <a:spcPts val="2659"/>
                 </a:lnSpc>
               </a:pPr>
+              <a:endParaRPr/>
             </a:p>
           </p:txBody>
         </p:sp>
       </p:grpSp>
       <p:sp>
         <p:nvSpPr>
-          <p:cNvPr name="Freeform 8" id="8"/>
+          <p:cNvPr id="8" name="Freeform 8"/>
           <p:cNvSpPr/>
           <p:nvPr/>
         </p:nvSpPr>
         <p:spPr>
-          <a:xfrm flipH="false" flipV="false" rot="0">
+          <a:xfrm>
             <a:off x="8479140" y="2057400"/>
             <a:ext cx="9259747" cy="8229600"/>
           </a:xfrm>
@@ -3348,9 +3289,9 @@
             <a:gdLst/>
             <a:ahLst/>
             <a:cxnLst/>
-            <a:rect r="r" b="b" t="t" l="l"/>
+            <a:rect l="l" t="t" r="r" b="b"/>
             <a:pathLst>
-              <a:path h="8229600" w="9259747">
+              <a:path w="9259747" h="8229600">
                 <a:moveTo>
                   <a:pt x="0" y="0"/>
                 </a:moveTo>
@@ -3373,19 +3314,19 @@
           <a:blipFill>
             <a:blip r:embed="rId2"/>
             <a:stretch>
-              <a:fillRect l="0" t="0" r="0" b="0"/>
+              <a:fillRect/>
             </a:stretch>
           </a:blipFill>
         </p:spPr>
       </p:sp>
       <p:sp>
         <p:nvSpPr>
-          <p:cNvPr name="Freeform 9" id="9"/>
+          <p:cNvPr id="9" name="Freeform 9"/>
           <p:cNvSpPr/>
           <p:nvPr/>
         </p:nvSpPr>
         <p:spPr>
-          <a:xfrm flipH="false" flipV="false" rot="426246">
+          <a:xfrm rot="426246">
             <a:off x="8621031" y="536895"/>
             <a:ext cx="1260869" cy="2372886"/>
           </a:xfrm>
@@ -3394,9 +3335,9 @@
             <a:gdLst/>
             <a:ahLst/>
             <a:cxnLst/>
-            <a:rect r="r" b="b" t="t" l="l"/>
+            <a:rect l="l" t="t" r="r" b="b"/>
             <a:pathLst>
-              <a:path h="2372886" w="1260869">
+              <a:path w="1260869" h="2372886">
                 <a:moveTo>
                   <a:pt x="0" y="0"/>
                 </a:moveTo>
@@ -3425,19 +3366,19 @@
               </a:extLst>
             </a:blip>
             <a:stretch>
-              <a:fillRect l="0" t="0" r="0" b="0"/>
+              <a:fillRect/>
             </a:stretch>
           </a:blipFill>
         </p:spPr>
       </p:sp>
       <p:sp>
         <p:nvSpPr>
-          <p:cNvPr name="Freeform 10" id="10"/>
+          <p:cNvPr id="10" name="Freeform 10"/>
           <p:cNvSpPr/>
           <p:nvPr/>
         </p:nvSpPr>
         <p:spPr>
-          <a:xfrm flipH="false" flipV="false" rot="0">
+          <a:xfrm>
             <a:off x="1066800" y="586294"/>
             <a:ext cx="884811" cy="884811"/>
           </a:xfrm>
@@ -3446,9 +3387,9 @@
             <a:gdLst/>
             <a:ahLst/>
             <a:cxnLst/>
-            <a:rect r="r" b="b" t="t" l="l"/>
+            <a:rect l="l" t="t" r="r" b="b"/>
             <a:pathLst>
-              <a:path h="884811" w="884811">
+              <a:path w="884811" h="884811">
                 <a:moveTo>
                   <a:pt x="0" y="0"/>
                 </a:moveTo>
@@ -3471,19 +3412,19 @@
           <a:blipFill>
             <a:blip r:embed="rId5"/>
             <a:stretch>
-              <a:fillRect l="0" t="0" r="0" b="0"/>
+              <a:fillRect/>
             </a:stretch>
           </a:blipFill>
         </p:spPr>
       </p:sp>
       <p:sp>
         <p:nvSpPr>
-          <p:cNvPr name="TextBox 11" id="11"/>
-          <p:cNvSpPr txBox="true"/>
-          <p:nvPr/>
-        </p:nvSpPr>
-        <p:spPr>
-          <a:xfrm rot="0">
+          <p:cNvPr id="11" name="TextBox 11"/>
+          <p:cNvSpPr txBox="1"/>
+          <p:nvPr/>
+        </p:nvSpPr>
+        <p:spPr>
+          <a:xfrm>
             <a:off x="1509206" y="4192626"/>
             <a:ext cx="7808404" cy="2418603"/>
           </a:xfrm>
@@ -3492,7 +3433,7 @@
           </a:prstGeom>
         </p:spPr>
         <p:txBody>
-          <a:bodyPr anchor="t" rtlCol="false" tIns="0" lIns="0" bIns="0" rIns="0">
+          <a:bodyPr lIns="0" tIns="0" rIns="0" bIns="0" rtlCol="0" anchor="t">
             <a:spAutoFit/>
           </a:bodyPr>
           <a:lstStyle/>
@@ -3532,12 +3473,12 @@
       </p:sp>
       <p:sp>
         <p:nvSpPr>
-          <p:cNvPr name="TextBox 12" id="12"/>
-          <p:cNvSpPr txBox="true"/>
-          <p:nvPr/>
-        </p:nvSpPr>
-        <p:spPr>
-          <a:xfrm rot="0">
+          <p:cNvPr id="12" name="TextBox 12"/>
+          <p:cNvSpPr txBox="1"/>
+          <p:nvPr/>
+        </p:nvSpPr>
+        <p:spPr>
+          <a:xfrm>
             <a:off x="2254895" y="877912"/>
             <a:ext cx="4593650" cy="339725"/>
           </a:xfrm>
@@ -3546,7 +3487,7 @@
           </a:prstGeom>
         </p:spPr>
         <p:txBody>
-          <a:bodyPr anchor="t" rtlCol="false" tIns="0" lIns="0" bIns="0" rIns="0">
+          <a:bodyPr lIns="0" tIns="0" rIns="0" bIns="0" rtlCol="0" anchor="t">
             <a:spAutoFit/>
           </a:bodyPr>
           <a:lstStyle/>
@@ -3577,13 +3518,14 @@
 </file>
 
 <file path=ppt/slides/slide2.xml><?xml version="1.0" encoding="utf-8"?>
-<p:sld xmlns:p="http://schemas.openxmlformats.org/presentationml/2006/main" xmlns:a="http://schemas.openxmlformats.org/drawingml/2006/main" xmlns:r="http://schemas.openxmlformats.org/officeDocument/2006/relationships">
+<p:sld xmlns:a="http://schemas.openxmlformats.org/drawingml/2006/main" xmlns:r="http://schemas.openxmlformats.org/officeDocument/2006/relationships" xmlns:p="http://schemas.openxmlformats.org/presentationml/2006/main">
   <p:cSld>
     <p:bg>
       <p:bgPr>
         <a:solidFill>
           <a:srgbClr val="F4F4F4"/>
         </a:solidFill>
+        <a:effectLst/>
       </p:bgPr>
     </p:bg>
     <p:spTree>
@@ -3602,12 +3544,12 @@
       </p:grpSpPr>
       <p:sp>
         <p:nvSpPr>
-          <p:cNvPr name="Freeform 2" id="2"/>
+          <p:cNvPr id="2" name="Freeform 2"/>
           <p:cNvSpPr/>
           <p:nvPr/>
         </p:nvSpPr>
         <p:spPr>
-          <a:xfrm flipH="false" flipV="false" rot="0">
+          <a:xfrm>
             <a:off x="-1294913" y="-2369132"/>
             <a:ext cx="4352438" cy="4114800"/>
           </a:xfrm>
@@ -3616,9 +3558,9 @@
             <a:gdLst/>
             <a:ahLst/>
             <a:cxnLst/>
-            <a:rect r="r" b="b" t="t" l="l"/>
+            <a:rect l="l" t="t" r="r" b="b"/>
             <a:pathLst>
-              <a:path h="4114800" w="4352438">
+              <a:path w="4352438" h="4114800">
                 <a:moveTo>
                   <a:pt x="0" y="0"/>
                 </a:moveTo>
@@ -3647,19 +3589,19 @@
               </a:extLst>
             </a:blip>
             <a:stretch>
-              <a:fillRect l="0" t="0" r="0" b="0"/>
+              <a:fillRect/>
             </a:stretch>
           </a:blipFill>
         </p:spPr>
       </p:sp>
       <p:sp>
         <p:nvSpPr>
-          <p:cNvPr name="Freeform 3" id="3"/>
+          <p:cNvPr id="3" name="Freeform 3"/>
           <p:cNvSpPr/>
           <p:nvPr/>
         </p:nvSpPr>
         <p:spPr>
-          <a:xfrm flipH="false" flipV="false" rot="-557672">
+          <a:xfrm rot="-557672">
             <a:off x="5935690" y="-949226"/>
             <a:ext cx="17071958" cy="16139850"/>
           </a:xfrm>
@@ -3668,9 +3610,9 @@
             <a:gdLst/>
             <a:ahLst/>
             <a:cxnLst/>
-            <a:rect r="r" b="b" t="t" l="l"/>
+            <a:rect l="l" t="t" r="r" b="b"/>
             <a:pathLst>
-              <a:path h="16139850" w="17071958">
+              <a:path w="17071958" h="16139850">
                 <a:moveTo>
                   <a:pt x="0" y="0"/>
                 </a:moveTo>
@@ -3699,19 +3641,19 @@
               </a:extLst>
             </a:blip>
             <a:stretch>
-              <a:fillRect l="0" t="0" r="0" b="0"/>
+              <a:fillRect/>
             </a:stretch>
           </a:blipFill>
         </p:spPr>
       </p:sp>
       <p:sp>
         <p:nvSpPr>
-          <p:cNvPr name="Freeform 4" id="4"/>
+          <p:cNvPr id="4" name="Freeform 4"/>
           <p:cNvSpPr/>
           <p:nvPr/>
         </p:nvSpPr>
         <p:spPr>
-          <a:xfrm flipH="false" flipV="false" rot="0">
+          <a:xfrm>
             <a:off x="9214866" y="1028700"/>
             <a:ext cx="8044434" cy="8229600"/>
           </a:xfrm>
@@ -3720,9 +3662,9 @@
             <a:gdLst/>
             <a:ahLst/>
             <a:cxnLst/>
-            <a:rect r="r" b="b" t="t" l="l"/>
+            <a:rect l="l" t="t" r="r" b="b"/>
             <a:pathLst>
-              <a:path h="8229600" w="8044434">
+              <a:path w="8044434" h="8229600">
                 <a:moveTo>
                   <a:pt x="0" y="0"/>
                 </a:moveTo>
@@ -3745,19 +3687,19 @@
           <a:blipFill>
             <a:blip r:embed="rId4"/>
             <a:stretch>
-              <a:fillRect l="0" t="0" r="0" b="0"/>
+              <a:fillRect/>
             </a:stretch>
           </a:blipFill>
         </p:spPr>
       </p:sp>
       <p:sp>
         <p:nvSpPr>
-          <p:cNvPr name="Freeform 5" id="5"/>
+          <p:cNvPr id="5" name="Freeform 5"/>
           <p:cNvSpPr/>
           <p:nvPr/>
         </p:nvSpPr>
         <p:spPr>
-          <a:xfrm flipH="false" flipV="false" rot="-1708731">
+          <a:xfrm rot="-1708731">
             <a:off x="10551230" y="1448974"/>
             <a:ext cx="842177" cy="683216"/>
           </a:xfrm>
@@ -3766,9 +3708,9 @@
             <a:gdLst/>
             <a:ahLst/>
             <a:cxnLst/>
-            <a:rect r="r" b="b" t="t" l="l"/>
+            <a:rect l="l" t="t" r="r" b="b"/>
             <a:pathLst>
-              <a:path h="683216" w="842177">
+              <a:path w="842177" h="683216">
                 <a:moveTo>
                   <a:pt x="0" y="0"/>
                 </a:moveTo>
@@ -3797,19 +3739,19 @@
               </a:extLst>
             </a:blip>
             <a:stretch>
-              <a:fillRect l="0" t="0" r="0" b="0"/>
+              <a:fillRect/>
             </a:stretch>
           </a:blipFill>
         </p:spPr>
       </p:sp>
       <p:sp>
         <p:nvSpPr>
-          <p:cNvPr name="TextBox 6" id="6"/>
-          <p:cNvSpPr txBox="true"/>
-          <p:nvPr/>
-        </p:nvSpPr>
-        <p:spPr>
-          <a:xfrm rot="0">
+          <p:cNvPr id="6" name="TextBox 6"/>
+          <p:cNvSpPr txBox="1"/>
+          <p:nvPr/>
+        </p:nvSpPr>
+        <p:spPr>
+          <a:xfrm>
             <a:off x="1028700" y="2239260"/>
             <a:ext cx="7808404" cy="3109491"/>
           </a:xfrm>
@@ -3818,7 +3760,7 @@
           </a:prstGeom>
         </p:spPr>
         <p:txBody>
-          <a:bodyPr anchor="t" rtlCol="false" tIns="0" lIns="0" bIns="0" rIns="0">
+          <a:bodyPr lIns="0" tIns="0" rIns="0" bIns="0" rtlCol="0" anchor="t">
             <a:spAutoFit/>
           </a:bodyPr>
           <a:lstStyle/>
@@ -3842,12 +3784,12 @@
       </p:sp>
       <p:sp>
         <p:nvSpPr>
-          <p:cNvPr name="TextBox 7" id="7"/>
-          <p:cNvSpPr txBox="true"/>
-          <p:nvPr/>
-        </p:nvSpPr>
-        <p:spPr>
-          <a:xfrm rot="0">
+          <p:cNvPr id="7" name="TextBox 7"/>
+          <p:cNvSpPr txBox="1"/>
+          <p:nvPr/>
+        </p:nvSpPr>
+        <p:spPr>
+          <a:xfrm>
             <a:off x="1028700" y="5444002"/>
             <a:ext cx="7506123" cy="2774888"/>
           </a:xfrm>
@@ -3856,7 +3798,7 @@
           </a:prstGeom>
         </p:spPr>
         <p:txBody>
-          <a:bodyPr anchor="t" rtlCol="false" tIns="0" lIns="0" bIns="0" rIns="0">
+          <a:bodyPr lIns="0" tIns="0" rIns="0" bIns="0" rtlCol="0" anchor="t">
             <a:spAutoFit/>
           </a:bodyPr>
           <a:lstStyle/>
@@ -3867,7 +3809,7 @@
               </a:lnSpc>
             </a:pPr>
             <a:r>
-              <a:rPr lang="en-US" sz="2001">
+              <a:rPr lang="en-US" sz="2001" dirty="0">
                 <a:solidFill>
                   <a:srgbClr val="000000"/>
                 </a:solidFill>
@@ -3880,12 +3822,12 @@
       </p:sp>
       <p:sp>
         <p:nvSpPr>
-          <p:cNvPr name="Freeform 8" id="8"/>
+          <p:cNvPr id="8" name="Freeform 8"/>
           <p:cNvSpPr/>
           <p:nvPr/>
         </p:nvSpPr>
         <p:spPr>
-          <a:xfrm flipH="false" flipV="false" rot="0">
+          <a:xfrm>
             <a:off x="1028700" y="1028700"/>
             <a:ext cx="884811" cy="884811"/>
           </a:xfrm>
@@ -3894,9 +3836,9 @@
             <a:gdLst/>
             <a:ahLst/>
             <a:cxnLst/>
-            <a:rect r="r" b="b" t="t" l="l"/>
+            <a:rect l="l" t="t" r="r" b="b"/>
             <a:pathLst>
-              <a:path h="884811" w="884811">
+              <a:path w="884811" h="884811">
                 <a:moveTo>
                   <a:pt x="0" y="0"/>
                 </a:moveTo>
@@ -3919,19 +3861,19 @@
           <a:blipFill>
             <a:blip r:embed="rId7"/>
             <a:stretch>
-              <a:fillRect l="0" t="0" r="0" b="0"/>
+              <a:fillRect/>
             </a:stretch>
           </a:blipFill>
         </p:spPr>
       </p:sp>
       <p:sp>
         <p:nvSpPr>
-          <p:cNvPr name="TextBox 9" id="9"/>
-          <p:cNvSpPr txBox="true"/>
-          <p:nvPr/>
-        </p:nvSpPr>
-        <p:spPr>
-          <a:xfrm rot="0">
+          <p:cNvPr id="9" name="TextBox 9"/>
+          <p:cNvSpPr txBox="1"/>
+          <p:nvPr/>
+        </p:nvSpPr>
+        <p:spPr>
+          <a:xfrm>
             <a:off x="2291499" y="1320293"/>
             <a:ext cx="4593650" cy="339725"/>
           </a:xfrm>
@@ -3940,7 +3882,7 @@
           </a:prstGeom>
         </p:spPr>
         <p:txBody>
-          <a:bodyPr anchor="t" rtlCol="false" tIns="0" lIns="0" bIns="0" rIns="0">
+          <a:bodyPr lIns="0" tIns="0" rIns="0" bIns="0" rtlCol="0" anchor="t">
             <a:spAutoFit/>
           </a:bodyPr>
           <a:lstStyle/>
@@ -3971,7 +3913,7 @@
 </file>
 
 <file path=ppt/slides/slide3.xml><?xml version="1.0" encoding="utf-8"?>
-<p:sld xmlns:p="http://schemas.openxmlformats.org/presentationml/2006/main" xmlns:a="http://schemas.openxmlformats.org/drawingml/2006/main" xmlns:r="http://schemas.openxmlformats.org/officeDocument/2006/relationships">
+<p:sld xmlns:a="http://schemas.openxmlformats.org/drawingml/2006/main" xmlns:r="http://schemas.openxmlformats.org/officeDocument/2006/relationships" xmlns:p="http://schemas.openxmlformats.org/presentationml/2006/main">
   <p:cSld>
     <p:spTree>
       <p:nvGrpSpPr>
@@ -3989,12 +3931,12 @@
       </p:grpSpPr>
       <p:grpSp>
         <p:nvGrpSpPr>
-          <p:cNvPr name="Group 2" id="2"/>
+          <p:cNvPr id="2" name="Group 2"/>
           <p:cNvGrpSpPr/>
           <p:nvPr/>
         </p:nvGrpSpPr>
         <p:grpSpPr>
-          <a:xfrm rot="0">
+          <a:xfrm>
             <a:off x="12916210" y="-266185"/>
             <a:ext cx="5659542" cy="10819370"/>
             <a:chOff x="0" y="0"/>
@@ -4003,12 +3945,12 @@
         </p:grpSpPr>
         <p:sp>
           <p:nvSpPr>
-            <p:cNvPr name="Freeform 3" id="3"/>
+            <p:cNvPr id="3" name="Freeform 3"/>
             <p:cNvSpPr/>
             <p:nvPr/>
           </p:nvSpPr>
           <p:spPr>
-            <a:xfrm flipH="false" flipV="false" rot="0">
+            <a:xfrm>
               <a:off x="0" y="0"/>
               <a:ext cx="208368" cy="398337"/>
             </a:xfrm>
@@ -4017,9 +3959,9 @@
               <a:gdLst/>
               <a:ahLst/>
               <a:cxnLst/>
-              <a:rect r="r" b="b" t="t" l="l"/>
+              <a:rect l="l" t="t" r="r" b="b"/>
               <a:pathLst>
-                <a:path h="398337" w="208368">
+                <a:path w="208368" h="398337">
                   <a:moveTo>
                     <a:pt x="0" y="0"/>
                   </a:moveTo>
@@ -4048,8 +3990,8 @@
         </p:sp>
         <p:sp>
           <p:nvSpPr>
-            <p:cNvPr name="TextBox 4" id="4"/>
-            <p:cNvSpPr txBox="true"/>
+            <p:cNvPr id="4" name="TextBox 4"/>
+            <p:cNvSpPr txBox="1"/>
             <p:nvPr/>
           </p:nvSpPr>
           <p:spPr>
@@ -4062,7 +4004,7 @@
             </a:prstGeom>
           </p:spPr>
           <p:txBody>
-            <a:bodyPr anchor="ctr" rtlCol="false" tIns="50800" lIns="50800" bIns="50800" rIns="50800"/>
+            <a:bodyPr lIns="50800" tIns="50800" rIns="50800" bIns="50800" rtlCol="0" anchor="ctr"/>
             <a:lstStyle/>
             <a:p>
               <a:pPr algn="ctr">
@@ -4070,18 +4012,19 @@
                   <a:spcPts val="2659"/>
                 </a:lnSpc>
               </a:pPr>
+              <a:endParaRPr/>
             </a:p>
           </p:txBody>
         </p:sp>
       </p:grpSp>
       <p:grpSp>
         <p:nvGrpSpPr>
-          <p:cNvPr name="Group 5" id="5"/>
+          <p:cNvPr id="5" name="Group 5"/>
           <p:cNvGrpSpPr/>
           <p:nvPr/>
         </p:nvGrpSpPr>
         <p:grpSpPr>
-          <a:xfrm rot="0">
+          <a:xfrm>
             <a:off x="-305722" y="-167940"/>
             <a:ext cx="607099" cy="10622880"/>
             <a:chOff x="0" y="0"/>
@@ -4090,12 +4033,12 @@
         </p:grpSpPr>
         <p:sp>
           <p:nvSpPr>
-            <p:cNvPr name="Freeform 6" id="6"/>
+            <p:cNvPr id="6" name="Freeform 6"/>
             <p:cNvSpPr/>
             <p:nvPr/>
           </p:nvSpPr>
           <p:spPr>
-            <a:xfrm flipH="false" flipV="false" rot="0">
+            <a:xfrm>
               <a:off x="0" y="0"/>
               <a:ext cx="48567" cy="849821"/>
             </a:xfrm>
@@ -4104,9 +4047,9 @@
               <a:gdLst/>
               <a:ahLst/>
               <a:cxnLst/>
-              <a:rect r="r" b="b" t="t" l="l"/>
+              <a:rect l="l" t="t" r="r" b="b"/>
               <a:pathLst>
-                <a:path h="849821" w="48567">
+                <a:path w="48567" h="849821">
                   <a:moveTo>
                     <a:pt x="0" y="0"/>
                   </a:moveTo>
@@ -4135,8 +4078,8 @@
         </p:sp>
         <p:sp>
           <p:nvSpPr>
-            <p:cNvPr name="TextBox 7" id="7"/>
-            <p:cNvSpPr txBox="true"/>
+            <p:cNvPr id="7" name="TextBox 7"/>
+            <p:cNvSpPr txBox="1"/>
             <p:nvPr/>
           </p:nvSpPr>
           <p:spPr>
@@ -4149,7 +4092,7 @@
             </a:prstGeom>
           </p:spPr>
           <p:txBody>
-            <a:bodyPr anchor="ctr" rtlCol="false" tIns="50800" lIns="50800" bIns="50800" rIns="50800"/>
+            <a:bodyPr lIns="50800" tIns="50800" rIns="50800" bIns="50800" rtlCol="0" anchor="ctr"/>
             <a:lstStyle/>
             <a:p>
               <a:pPr algn="ctr">
@@ -4157,18 +4100,19 @@
                   <a:spcPts val="2659"/>
                 </a:lnSpc>
               </a:pPr>
+              <a:endParaRPr/>
             </a:p>
           </p:txBody>
         </p:sp>
       </p:grpSp>
       <p:sp>
         <p:nvSpPr>
-          <p:cNvPr name="Freeform 8" id="8"/>
+          <p:cNvPr id="8" name="Freeform 8"/>
           <p:cNvSpPr/>
           <p:nvPr/>
         </p:nvSpPr>
         <p:spPr>
-          <a:xfrm flipH="false" flipV="false" rot="0">
+          <a:xfrm>
             <a:off x="1028700" y="586294"/>
             <a:ext cx="884811" cy="884811"/>
           </a:xfrm>
@@ -4177,9 +4121,9 @@
             <a:gdLst/>
             <a:ahLst/>
             <a:cxnLst/>
-            <a:rect r="r" b="b" t="t" l="l"/>
+            <a:rect l="l" t="t" r="r" b="b"/>
             <a:pathLst>
-              <a:path h="884811" w="884811">
+              <a:path w="884811" h="884811">
                 <a:moveTo>
                   <a:pt x="0" y="0"/>
                 </a:moveTo>
@@ -4202,19 +4146,19 @@
           <a:blipFill>
             <a:blip r:embed="rId2"/>
             <a:stretch>
-              <a:fillRect l="0" t="0" r="0" b="0"/>
+              <a:fillRect/>
             </a:stretch>
           </a:blipFill>
         </p:spPr>
       </p:sp>
       <p:sp>
         <p:nvSpPr>
-          <p:cNvPr name="Freeform 9" id="9"/>
+          <p:cNvPr id="9" name="Freeform 9"/>
           <p:cNvSpPr/>
           <p:nvPr/>
         </p:nvSpPr>
         <p:spPr>
-          <a:xfrm flipH="false" flipV="false" rot="0">
+          <a:xfrm>
             <a:off x="1028700" y="5164989"/>
             <a:ext cx="755284" cy="755284"/>
           </a:xfrm>
@@ -4223,9 +4167,9 @@
             <a:gdLst/>
             <a:ahLst/>
             <a:cxnLst/>
-            <a:rect r="r" b="b" t="t" l="l"/>
+            <a:rect l="l" t="t" r="r" b="b"/>
             <a:pathLst>
-              <a:path h="755284" w="755284">
+              <a:path w="755284" h="755284">
                 <a:moveTo>
                   <a:pt x="0" y="0"/>
                 </a:moveTo>
@@ -4254,19 +4198,19 @@
               </a:extLst>
             </a:blip>
             <a:stretch>
-              <a:fillRect l="0" t="0" r="0" b="0"/>
+              <a:fillRect/>
             </a:stretch>
           </a:blipFill>
         </p:spPr>
       </p:sp>
       <p:sp>
         <p:nvSpPr>
-          <p:cNvPr name="Freeform 10" id="10"/>
+          <p:cNvPr id="10" name="Freeform 10"/>
           <p:cNvSpPr/>
           <p:nvPr/>
         </p:nvSpPr>
         <p:spPr>
-          <a:xfrm flipH="false" flipV="false" rot="0">
+          <a:xfrm>
             <a:off x="955344" y="6746800"/>
             <a:ext cx="803541" cy="803541"/>
           </a:xfrm>
@@ -4275,9 +4219,9 @@
             <a:gdLst/>
             <a:ahLst/>
             <a:cxnLst/>
-            <a:rect r="r" b="b" t="t" l="l"/>
+            <a:rect l="l" t="t" r="r" b="b"/>
             <a:pathLst>
-              <a:path h="803541" w="803541">
+              <a:path w="803541" h="803541">
                 <a:moveTo>
                   <a:pt x="0" y="0"/>
                 </a:moveTo>
@@ -4306,19 +4250,19 @@
               </a:extLst>
             </a:blip>
             <a:stretch>
-              <a:fillRect l="0" t="0" r="0" b="0"/>
+              <a:fillRect/>
             </a:stretch>
           </a:blipFill>
         </p:spPr>
       </p:sp>
       <p:sp>
         <p:nvSpPr>
-          <p:cNvPr name="Freeform 11" id="11"/>
+          <p:cNvPr id="11" name="Freeform 11"/>
           <p:cNvSpPr/>
           <p:nvPr/>
         </p:nvSpPr>
         <p:spPr>
-          <a:xfrm flipH="false" flipV="false" rot="0">
+          <a:xfrm>
             <a:off x="955344" y="8376868"/>
             <a:ext cx="828641" cy="828641"/>
           </a:xfrm>
@@ -4327,9 +4271,9 @@
             <a:gdLst/>
             <a:ahLst/>
             <a:cxnLst/>
-            <a:rect r="r" b="b" t="t" l="l"/>
+            <a:rect l="l" t="t" r="r" b="b"/>
             <a:pathLst>
-              <a:path h="828641" w="828641">
+              <a:path w="828641" h="828641">
                 <a:moveTo>
                   <a:pt x="0" y="0"/>
                 </a:moveTo>
@@ -4358,19 +4302,19 @@
               </a:extLst>
             </a:blip>
             <a:stretch>
-              <a:fillRect l="0" t="0" r="0" b="0"/>
+              <a:fillRect/>
             </a:stretch>
           </a:blipFill>
         </p:spPr>
       </p:sp>
       <p:sp>
         <p:nvSpPr>
-          <p:cNvPr name="TextBox 12" id="12"/>
-          <p:cNvSpPr txBox="true"/>
-          <p:nvPr/>
-        </p:nvSpPr>
-        <p:spPr>
-          <a:xfrm rot="0">
+          <p:cNvPr id="12" name="TextBox 12"/>
+          <p:cNvSpPr txBox="1"/>
+          <p:nvPr/>
+        </p:nvSpPr>
+        <p:spPr>
+          <a:xfrm>
             <a:off x="1028700" y="2110903"/>
             <a:ext cx="11704757" cy="1530088"/>
           </a:xfrm>
@@ -4379,7 +4323,7 @@
           </a:prstGeom>
         </p:spPr>
         <p:txBody>
-          <a:bodyPr anchor="t" rtlCol="false" tIns="0" lIns="0" bIns="0" rIns="0">
+          <a:bodyPr lIns="0" tIns="0" rIns="0" bIns="0" rtlCol="0" anchor="t">
             <a:spAutoFit/>
           </a:bodyPr>
           <a:lstStyle/>
@@ -4403,12 +4347,12 @@
       </p:sp>
       <p:sp>
         <p:nvSpPr>
-          <p:cNvPr name="TextBox 13" id="13"/>
-          <p:cNvSpPr txBox="true"/>
-          <p:nvPr/>
-        </p:nvSpPr>
-        <p:spPr>
-          <a:xfrm rot="0">
+          <p:cNvPr id="13" name="TextBox 13"/>
+          <p:cNvSpPr txBox="1"/>
+          <p:nvPr/>
+        </p:nvSpPr>
+        <p:spPr>
+          <a:xfrm>
             <a:off x="2216795" y="877912"/>
             <a:ext cx="4593650" cy="339725"/>
           </a:xfrm>
@@ -4417,7 +4361,7 @@
           </a:prstGeom>
         </p:spPr>
         <p:txBody>
-          <a:bodyPr anchor="t" rtlCol="false" tIns="0" lIns="0" bIns="0" rIns="0">
+          <a:bodyPr lIns="0" tIns="0" rIns="0" bIns="0" rtlCol="0" anchor="t">
             <a:spAutoFit/>
           </a:bodyPr>
           <a:lstStyle/>
@@ -4441,12 +4385,12 @@
       </p:sp>
       <p:sp>
         <p:nvSpPr>
-          <p:cNvPr name="TextBox 14" id="14"/>
-          <p:cNvSpPr txBox="true"/>
-          <p:nvPr/>
-        </p:nvSpPr>
-        <p:spPr>
-          <a:xfrm rot="0">
+          <p:cNvPr id="14" name="TextBox 14"/>
+          <p:cNvSpPr txBox="1"/>
+          <p:nvPr/>
+        </p:nvSpPr>
+        <p:spPr>
+          <a:xfrm>
             <a:off x="301377" y="4107716"/>
             <a:ext cx="12354541" cy="563879"/>
           </a:xfrm>
@@ -4455,7 +4399,7 @@
           </a:prstGeom>
         </p:spPr>
         <p:txBody>
-          <a:bodyPr anchor="t" rtlCol="false" tIns="0" lIns="0" bIns="0" rIns="0">
+          <a:bodyPr lIns="0" tIns="0" rIns="0" bIns="0" rtlCol="0" anchor="t">
             <a:spAutoFit/>
           </a:bodyPr>
           <a:lstStyle/>
@@ -4472,28 +4416,19 @@
                 </a:solidFill>
                 <a:latin typeface="Canva Sans"/>
               </a:rPr>
-              <a:t>H</a:t>
-            </a:r>
-            <a:r>
-              <a:rPr lang="en-US" sz="3300">
-                <a:solidFill>
-                  <a:srgbClr val="000000"/>
-                </a:solidFill>
-                <a:latin typeface="Canva Sans"/>
-              </a:rPr>
-              <a:t>acking experts follow four key protocol concepts:</a:t>
-            </a:r>
-          </a:p>
-        </p:txBody>
-      </p:sp>
-      <p:sp>
-        <p:nvSpPr>
-          <p:cNvPr name="TextBox 15" id="15"/>
-          <p:cNvSpPr txBox="true"/>
-          <p:nvPr/>
-        </p:nvSpPr>
-        <p:spPr>
-          <a:xfrm rot="0">
+              <a:t>Hacking experts follow four key protocol concepts:</a:t>
+            </a:r>
+          </a:p>
+        </p:txBody>
+      </p:sp>
+      <p:sp>
+        <p:nvSpPr>
+          <p:cNvPr id="15" name="TextBox 15"/>
+          <p:cNvSpPr txBox="1"/>
+          <p:nvPr/>
+        </p:nvSpPr>
+        <p:spPr>
+          <a:xfrm>
             <a:off x="1940124" y="5117364"/>
             <a:ext cx="10819946" cy="789304"/>
           </a:xfrm>
@@ -4502,7 +4437,7 @@
           </a:prstGeom>
         </p:spPr>
         <p:txBody>
-          <a:bodyPr anchor="t" rtlCol="false" tIns="0" lIns="0" bIns="0" rIns="0">
+          <a:bodyPr lIns="0" tIns="0" rIns="0" bIns="0" rtlCol="0" anchor="t">
             <a:spAutoFit/>
           </a:bodyPr>
           <a:lstStyle/>
@@ -4519,8 +4454,37 @@
                 </a:solidFill>
                 <a:latin typeface="Canva Sans"/>
               </a:rPr>
-              <a:t>St</a:t>
-            </a:r>
+              <a:t>Stay legal. Obtain proper approval before accessing and performing a security assessment.</a:t>
+            </a:r>
+          </a:p>
+        </p:txBody>
+      </p:sp>
+      <p:sp>
+        <p:nvSpPr>
+          <p:cNvPr id="16" name="TextBox 16"/>
+          <p:cNvSpPr txBox="1"/>
+          <p:nvPr/>
+        </p:nvSpPr>
+        <p:spPr>
+          <a:xfrm>
+            <a:off x="1940124" y="6699175"/>
+            <a:ext cx="10819946" cy="1189354"/>
+          </a:xfrm>
+          <a:prstGeom prst="rect">
+            <a:avLst/>
+          </a:prstGeom>
+        </p:spPr>
+        <p:txBody>
+          <a:bodyPr lIns="0" tIns="0" rIns="0" bIns="0" rtlCol="0" anchor="t">
+            <a:spAutoFit/>
+          </a:bodyPr>
+          <a:lstStyle/>
+          <a:p>
+            <a:pPr>
+              <a:lnSpc>
+                <a:spcPts val="3220"/>
+              </a:lnSpc>
+            </a:pPr>
             <a:r>
               <a:rPr lang="en-US" sz="2300">
                 <a:solidFill>
@@ -4528,28 +4492,28 @@
                 </a:solidFill>
                 <a:latin typeface="Canva Sans"/>
               </a:rPr>
-              <a:t>ay legal. Obtain proper approval before accessing and performing a security assessment.</a:t>
-            </a:r>
-          </a:p>
-        </p:txBody>
-      </p:sp>
-      <p:sp>
-        <p:nvSpPr>
-          <p:cNvPr name="TextBox 16" id="16"/>
-          <p:cNvSpPr txBox="true"/>
-          <p:nvPr/>
-        </p:nvSpPr>
-        <p:spPr>
-          <a:xfrm rot="0">
-            <a:off x="1940124" y="6699175"/>
-            <a:ext cx="10819946" cy="1189354"/>
+              <a:t>Define the scope. Determine the scope of the assessment so that the ethical hacker’s work remains legal and within the organization’s approved boundaries.</a:t>
+            </a:r>
+          </a:p>
+        </p:txBody>
+      </p:sp>
+      <p:sp>
+        <p:nvSpPr>
+          <p:cNvPr id="17" name="TextBox 17"/>
+          <p:cNvSpPr txBox="1"/>
+          <p:nvPr/>
+        </p:nvSpPr>
+        <p:spPr>
+          <a:xfrm>
+            <a:off x="1940124" y="8439785"/>
+            <a:ext cx="10819946" cy="1589404"/>
           </a:xfrm>
           <a:prstGeom prst="rect">
             <a:avLst/>
           </a:prstGeom>
         </p:spPr>
         <p:txBody>
-          <a:bodyPr anchor="t" rtlCol="false" tIns="0" lIns="0" bIns="0" rIns="0">
+          <a:bodyPr lIns="0" tIns="0" rIns="0" bIns="0" rtlCol="0" anchor="t">
             <a:spAutoFit/>
           </a:bodyPr>
           <a:lstStyle/>
@@ -4566,71 +4530,21 @@
                 </a:solidFill>
                 <a:latin typeface="Canva Sans"/>
               </a:rPr>
-              <a:t>Define the</a:t>
-            </a:r>
-            <a:r>
-              <a:rPr lang="en-US" sz="2300">
-                <a:solidFill>
-                  <a:srgbClr val="000000"/>
-                </a:solidFill>
-                <a:latin typeface="Canva Sans"/>
-              </a:rPr>
-              <a:t> scope. Determine the scope of the assessment so that the ethical hacker’s work remains legal and within the organization’s approved boundaries.</a:t>
-            </a:r>
-          </a:p>
-        </p:txBody>
-      </p:sp>
-      <p:sp>
-        <p:nvSpPr>
-          <p:cNvPr name="TextBox 17" id="17"/>
-          <p:cNvSpPr txBox="true"/>
-          <p:nvPr/>
-        </p:nvSpPr>
-        <p:spPr>
-          <a:xfrm rot="0">
-            <a:off x="1940124" y="8439785"/>
-            <a:ext cx="10819946" cy="1589404"/>
-          </a:xfrm>
-          <a:prstGeom prst="rect">
-            <a:avLst/>
-          </a:prstGeom>
-        </p:spPr>
-        <p:txBody>
-          <a:bodyPr anchor="t" rtlCol="false" tIns="0" lIns="0" bIns="0" rIns="0">
-            <a:spAutoFit/>
-          </a:bodyPr>
-          <a:lstStyle/>
+              <a:t>Report vulnerabilities. Notify the organization of all vulnerabilities discovered during the assessment. Provide remediation advice for resolving these vulnerabilities.</a:t>
+            </a:r>
+          </a:p>
           <a:p>
             <a:pPr>
               <a:lnSpc>
                 <a:spcPts val="3220"/>
               </a:lnSpc>
             </a:pPr>
-            <a:r>
-              <a:rPr lang="en-US" sz="2300">
-                <a:solidFill>
-                  <a:srgbClr val="000000"/>
-                </a:solidFill>
-                <a:latin typeface="Canva Sans"/>
-              </a:rPr>
-              <a:t>Report vulnerabilities.</a:t>
-            </a:r>
-            <a:r>
-              <a:rPr lang="en-US" sz="2300">
-                <a:solidFill>
-                  <a:srgbClr val="000000"/>
-                </a:solidFill>
-                <a:latin typeface="Canva Sans"/>
-              </a:rPr>
-              <a:t> Notify the organization of all vulnerabilities discovered during the assessment. Provide remediation advice for resolving these vulnerabilities.</a:t>
-            </a:r>
-          </a:p>
-          <a:p>
-            <a:pPr>
-              <a:lnSpc>
-                <a:spcPts val="3220"/>
-              </a:lnSpc>
-            </a:pPr>
+            <a:endParaRPr lang="en-US" sz="2300">
+              <a:solidFill>
+                <a:srgbClr val="000000"/>
+              </a:solidFill>
+              <a:latin typeface="Canva Sans"/>
+            </a:endParaRPr>
           </a:p>
         </p:txBody>
       </p:sp>
@@ -4643,7 +4557,7 @@
 </file>
 
 <file path=ppt/slides/slide4.xml><?xml version="1.0" encoding="utf-8"?>
-<p:sld xmlns:p="http://schemas.openxmlformats.org/presentationml/2006/main" xmlns:a="http://schemas.openxmlformats.org/drawingml/2006/main" xmlns:r="http://schemas.openxmlformats.org/officeDocument/2006/relationships">
+<p:sld xmlns:a="http://schemas.openxmlformats.org/drawingml/2006/main" xmlns:r="http://schemas.openxmlformats.org/officeDocument/2006/relationships" xmlns:p="http://schemas.openxmlformats.org/presentationml/2006/main">
   <p:cSld>
     <p:spTree>
       <p:nvGrpSpPr>
@@ -4661,12 +4575,12 @@
       </p:grpSpPr>
       <p:grpSp>
         <p:nvGrpSpPr>
-          <p:cNvPr name="Group 2" id="2"/>
+          <p:cNvPr id="2" name="Group 2"/>
           <p:cNvGrpSpPr/>
           <p:nvPr/>
         </p:nvGrpSpPr>
         <p:grpSpPr>
-          <a:xfrm rot="0">
+          <a:xfrm>
             <a:off x="12916210" y="-266185"/>
             <a:ext cx="5659542" cy="10819370"/>
             <a:chOff x="0" y="0"/>
@@ -4675,12 +4589,12 @@
         </p:grpSpPr>
         <p:sp>
           <p:nvSpPr>
-            <p:cNvPr name="Freeform 3" id="3"/>
+            <p:cNvPr id="3" name="Freeform 3"/>
             <p:cNvSpPr/>
             <p:nvPr/>
           </p:nvSpPr>
           <p:spPr>
-            <a:xfrm flipH="false" flipV="false" rot="0">
+            <a:xfrm>
               <a:off x="0" y="0"/>
               <a:ext cx="208368" cy="398337"/>
             </a:xfrm>
@@ -4689,9 +4603,9 @@
               <a:gdLst/>
               <a:ahLst/>
               <a:cxnLst/>
-              <a:rect r="r" b="b" t="t" l="l"/>
+              <a:rect l="l" t="t" r="r" b="b"/>
               <a:pathLst>
-                <a:path h="398337" w="208368">
+                <a:path w="208368" h="398337">
                   <a:moveTo>
                     <a:pt x="0" y="0"/>
                   </a:moveTo>
@@ -4720,8 +4634,8 @@
         </p:sp>
         <p:sp>
           <p:nvSpPr>
-            <p:cNvPr name="TextBox 4" id="4"/>
-            <p:cNvSpPr txBox="true"/>
+            <p:cNvPr id="4" name="TextBox 4"/>
+            <p:cNvSpPr txBox="1"/>
             <p:nvPr/>
           </p:nvSpPr>
           <p:spPr>
@@ -4734,7 +4648,7 @@
             </a:prstGeom>
           </p:spPr>
           <p:txBody>
-            <a:bodyPr anchor="ctr" rtlCol="false" tIns="50800" lIns="50800" bIns="50800" rIns="50800"/>
+            <a:bodyPr lIns="50800" tIns="50800" rIns="50800" bIns="50800" rtlCol="0" anchor="ctr"/>
             <a:lstStyle/>
             <a:p>
               <a:pPr algn="ctr">
@@ -4742,18 +4656,19 @@
                   <a:spcPts val="2659"/>
                 </a:lnSpc>
               </a:pPr>
+              <a:endParaRPr/>
             </a:p>
           </p:txBody>
         </p:sp>
       </p:grpSp>
       <p:sp>
         <p:nvSpPr>
-          <p:cNvPr name="TextBox 5" id="5"/>
-          <p:cNvSpPr txBox="true"/>
-          <p:nvPr/>
-        </p:nvSpPr>
-        <p:spPr>
-          <a:xfrm rot="0">
+          <p:cNvPr id="5" name="TextBox 5"/>
+          <p:cNvSpPr txBox="1"/>
+          <p:nvPr/>
+        </p:nvSpPr>
+        <p:spPr>
+          <a:xfrm>
             <a:off x="1028700" y="1826140"/>
             <a:ext cx="11887510" cy="2228216"/>
           </a:xfrm>
@@ -4762,7 +4677,7 @@
           </a:prstGeom>
         </p:spPr>
         <p:txBody>
-          <a:bodyPr anchor="t" rtlCol="false" tIns="0" lIns="0" bIns="0" rIns="0">
+          <a:bodyPr lIns="0" tIns="0" rIns="0" bIns="0" rtlCol="0" anchor="t">
             <a:spAutoFit/>
           </a:bodyPr>
           <a:lstStyle/>
@@ -4786,12 +4701,12 @@
       </p:sp>
       <p:grpSp>
         <p:nvGrpSpPr>
-          <p:cNvPr name="Group 6" id="6"/>
+          <p:cNvPr id="6" name="Group 6"/>
           <p:cNvGrpSpPr/>
           <p:nvPr/>
         </p:nvGrpSpPr>
         <p:grpSpPr>
-          <a:xfrm rot="0">
+          <a:xfrm>
             <a:off x="-305722" y="-167940"/>
             <a:ext cx="607099" cy="10622880"/>
             <a:chOff x="0" y="0"/>
@@ -4800,12 +4715,12 @@
         </p:grpSpPr>
         <p:sp>
           <p:nvSpPr>
-            <p:cNvPr name="Freeform 7" id="7"/>
+            <p:cNvPr id="7" name="Freeform 7"/>
             <p:cNvSpPr/>
             <p:nvPr/>
           </p:nvSpPr>
           <p:spPr>
-            <a:xfrm flipH="false" flipV="false" rot="0">
+            <a:xfrm>
               <a:off x="0" y="0"/>
               <a:ext cx="48567" cy="849821"/>
             </a:xfrm>
@@ -4814,9 +4729,9 @@
               <a:gdLst/>
               <a:ahLst/>
               <a:cxnLst/>
-              <a:rect r="r" b="b" t="t" l="l"/>
+              <a:rect l="l" t="t" r="r" b="b"/>
               <a:pathLst>
-                <a:path h="849821" w="48567">
+                <a:path w="48567" h="849821">
                   <a:moveTo>
                     <a:pt x="0" y="0"/>
                   </a:moveTo>
@@ -4845,8 +4760,8 @@
         </p:sp>
         <p:sp>
           <p:nvSpPr>
-            <p:cNvPr name="TextBox 8" id="8"/>
-            <p:cNvSpPr txBox="true"/>
+            <p:cNvPr id="8" name="TextBox 8"/>
+            <p:cNvSpPr txBox="1"/>
             <p:nvPr/>
           </p:nvSpPr>
           <p:spPr>
@@ -4859,7 +4774,7 @@
             </a:prstGeom>
           </p:spPr>
           <p:txBody>
-            <a:bodyPr anchor="ctr" rtlCol="false" tIns="50800" lIns="50800" bIns="50800" rIns="50800"/>
+            <a:bodyPr lIns="50800" tIns="50800" rIns="50800" bIns="50800" rtlCol="0" anchor="ctr"/>
             <a:lstStyle/>
             <a:p>
               <a:pPr algn="ctr">
@@ -4867,18 +4782,19 @@
                   <a:spcPts val="2659"/>
                 </a:lnSpc>
               </a:pPr>
+              <a:endParaRPr/>
             </a:p>
           </p:txBody>
         </p:sp>
       </p:grpSp>
       <p:sp>
         <p:nvSpPr>
-          <p:cNvPr name="Freeform 9" id="9"/>
+          <p:cNvPr id="9" name="Freeform 9"/>
           <p:cNvSpPr/>
           <p:nvPr/>
         </p:nvSpPr>
         <p:spPr>
-          <a:xfrm flipH="false" flipV="false" rot="0">
+          <a:xfrm>
             <a:off x="1028700" y="586294"/>
             <a:ext cx="884811" cy="884811"/>
           </a:xfrm>
@@ -4887,9 +4803,9 @@
             <a:gdLst/>
             <a:ahLst/>
             <a:cxnLst/>
-            <a:rect r="r" b="b" t="t" l="l"/>
+            <a:rect l="l" t="t" r="r" b="b"/>
             <a:pathLst>
-              <a:path h="884811" w="884811">
+              <a:path w="884811" h="884811">
                 <a:moveTo>
                   <a:pt x="0" y="0"/>
                 </a:moveTo>
@@ -4912,19 +4828,19 @@
           <a:blipFill>
             <a:blip r:embed="rId2"/>
             <a:stretch>
-              <a:fillRect l="0" t="0" r="0" b="0"/>
+              <a:fillRect/>
             </a:stretch>
           </a:blipFill>
         </p:spPr>
       </p:sp>
       <p:sp>
         <p:nvSpPr>
-          <p:cNvPr name="TextBox 10" id="10"/>
-          <p:cNvSpPr txBox="true"/>
-          <p:nvPr/>
-        </p:nvSpPr>
-        <p:spPr>
-          <a:xfrm rot="0">
+          <p:cNvPr id="10" name="TextBox 10"/>
+          <p:cNvSpPr txBox="1"/>
+          <p:nvPr/>
+        </p:nvSpPr>
+        <p:spPr>
+          <a:xfrm>
             <a:off x="2216795" y="877912"/>
             <a:ext cx="4593650" cy="339725"/>
           </a:xfrm>
@@ -4933,7 +4849,7 @@
           </a:prstGeom>
         </p:spPr>
         <p:txBody>
-          <a:bodyPr anchor="t" rtlCol="false" tIns="0" lIns="0" bIns="0" rIns="0">
+          <a:bodyPr lIns="0" tIns="0" rIns="0" bIns="0" rtlCol="0" anchor="t">
             <a:spAutoFit/>
           </a:bodyPr>
           <a:lstStyle/>
@@ -4957,12 +4873,12 @@
       </p:sp>
       <p:sp>
         <p:nvSpPr>
-          <p:cNvPr name="TextBox 11" id="11"/>
-          <p:cNvSpPr txBox="true"/>
-          <p:nvPr/>
-        </p:nvSpPr>
-        <p:spPr>
-          <a:xfrm rot="0">
+          <p:cNvPr id="11" name="TextBox 11"/>
+          <p:cNvSpPr txBox="1"/>
+          <p:nvPr/>
+        </p:nvSpPr>
+        <p:spPr>
+          <a:xfrm>
             <a:off x="1028700" y="4187706"/>
             <a:ext cx="11887510" cy="1471930"/>
           </a:xfrm>
@@ -4971,7 +4887,7 @@
           </a:prstGeom>
         </p:spPr>
         <p:txBody>
-          <a:bodyPr anchor="t" rtlCol="false" tIns="0" lIns="0" bIns="0" rIns="0">
+          <a:bodyPr lIns="0" tIns="0" rIns="0" bIns="0" rtlCol="0" anchor="t">
             <a:spAutoFit/>
           </a:bodyPr>
           <a:lstStyle/>
@@ -4995,12 +4911,12 @@
       </p:sp>
       <p:sp>
         <p:nvSpPr>
-          <p:cNvPr name="TextBox 12" id="12"/>
-          <p:cNvSpPr txBox="true"/>
-          <p:nvPr/>
-        </p:nvSpPr>
-        <p:spPr>
-          <a:xfrm rot="0">
+          <p:cNvPr id="12" name="TextBox 12"/>
+          <p:cNvSpPr txBox="1"/>
+          <p:nvPr/>
+        </p:nvSpPr>
+        <p:spPr>
+          <a:xfrm>
             <a:off x="1028700" y="5792985"/>
             <a:ext cx="11887510" cy="2462530"/>
           </a:xfrm>
@@ -5009,7 +4925,7 @@
           </a:prstGeom>
         </p:spPr>
         <p:txBody>
-          <a:bodyPr anchor="t" rtlCol="false" tIns="0" lIns="0" bIns="0" rIns="0">
+          <a:bodyPr lIns="0" tIns="0" rIns="0" bIns="0" rtlCol="0" anchor="t">
             <a:spAutoFit/>
           </a:bodyPr>
           <a:lstStyle/>
@@ -5040,7 +4956,7 @@
 </file>
 
 <file path=ppt/slides/slide5.xml><?xml version="1.0" encoding="utf-8"?>
-<p:sld xmlns:p="http://schemas.openxmlformats.org/presentationml/2006/main" xmlns:a="http://schemas.openxmlformats.org/drawingml/2006/main" xmlns:r="http://schemas.openxmlformats.org/officeDocument/2006/relationships">
+<p:sld xmlns:a="http://schemas.openxmlformats.org/drawingml/2006/main" xmlns:r="http://schemas.openxmlformats.org/officeDocument/2006/relationships" xmlns:p="http://schemas.openxmlformats.org/presentationml/2006/main">
   <p:cSld>
     <p:spTree>
       <p:nvGrpSpPr>
@@ -5058,12 +4974,12 @@
       </p:grpSpPr>
       <p:grpSp>
         <p:nvGrpSpPr>
-          <p:cNvPr name="Group 2" id="2"/>
+          <p:cNvPr id="2" name="Group 2"/>
           <p:cNvGrpSpPr/>
           <p:nvPr/>
         </p:nvGrpSpPr>
         <p:grpSpPr>
-          <a:xfrm rot="0">
+          <a:xfrm>
             <a:off x="11420703" y="-554638"/>
             <a:ext cx="10787172" cy="11396276"/>
             <a:chOff x="0" y="0"/>
@@ -5072,12 +4988,12 @@
         </p:grpSpPr>
         <p:sp>
           <p:nvSpPr>
-            <p:cNvPr name="Freeform 3" id="3"/>
+            <p:cNvPr id="3" name="Freeform 3"/>
             <p:cNvSpPr/>
             <p:nvPr/>
           </p:nvSpPr>
           <p:spPr>
-            <a:xfrm flipH="false" flipV="false" rot="0">
+            <a:xfrm>
               <a:off x="0" y="0"/>
               <a:ext cx="668398" cy="706139"/>
             </a:xfrm>
@@ -5086,9 +5002,9 @@
               <a:gdLst/>
               <a:ahLst/>
               <a:cxnLst/>
-              <a:rect r="r" b="b" t="t" l="l"/>
+              <a:rect l="l" t="t" r="r" b="b"/>
               <a:pathLst>
-                <a:path h="706139" w="668398">
+                <a:path w="668398" h="706139">
                   <a:moveTo>
                     <a:pt x="334199" y="0"/>
                   </a:moveTo>
@@ -5128,8 +5044,8 @@
         </p:sp>
         <p:sp>
           <p:nvSpPr>
-            <p:cNvPr name="TextBox 4" id="4"/>
-            <p:cNvSpPr txBox="true"/>
+            <p:cNvPr id="4" name="TextBox 4"/>
+            <p:cNvSpPr txBox="1"/>
             <p:nvPr/>
           </p:nvSpPr>
           <p:spPr>
@@ -5142,7 +5058,7 @@
             </a:prstGeom>
           </p:spPr>
           <p:txBody>
-            <a:bodyPr anchor="ctr" rtlCol="false" tIns="50800" lIns="50800" bIns="50800" rIns="50800"/>
+            <a:bodyPr lIns="50800" tIns="50800" rIns="50800" bIns="50800" rtlCol="0" anchor="ctr"/>
             <a:lstStyle/>
             <a:p>
               <a:pPr algn="ctr">
@@ -5150,18 +5066,19 @@
                   <a:spcPts val="2659"/>
                 </a:lnSpc>
               </a:pPr>
+              <a:endParaRPr/>
             </a:p>
           </p:txBody>
         </p:sp>
       </p:grpSp>
       <p:sp>
         <p:nvSpPr>
-          <p:cNvPr name="TextBox 5" id="5"/>
-          <p:cNvSpPr txBox="true"/>
-          <p:nvPr/>
-        </p:nvSpPr>
-        <p:spPr>
-          <a:xfrm rot="0">
+          <p:cNvPr id="5" name="TextBox 5"/>
+          <p:cNvSpPr txBox="1"/>
+          <p:nvPr/>
+        </p:nvSpPr>
+        <p:spPr>
+          <a:xfrm>
             <a:off x="1028700" y="1965512"/>
             <a:ext cx="8358971" cy="2577176"/>
           </a:xfrm>
@@ -5170,7 +5087,7 @@
           </a:prstGeom>
         </p:spPr>
         <p:txBody>
-          <a:bodyPr anchor="t" rtlCol="false" tIns="0" lIns="0" bIns="0" rIns="0">
+          <a:bodyPr lIns="0" tIns="0" rIns="0" bIns="0" rtlCol="0" anchor="t">
             <a:spAutoFit/>
           </a:bodyPr>
           <a:lstStyle/>
@@ -5194,12 +5111,12 @@
       </p:sp>
       <p:grpSp>
         <p:nvGrpSpPr>
-          <p:cNvPr name="Group 6" id="6"/>
+          <p:cNvPr id="6" name="Group 6"/>
           <p:cNvGrpSpPr/>
           <p:nvPr/>
         </p:nvGrpSpPr>
         <p:grpSpPr>
-          <a:xfrm rot="0">
+          <a:xfrm>
             <a:off x="-305722" y="-167940"/>
             <a:ext cx="607099" cy="10622880"/>
             <a:chOff x="0" y="0"/>
@@ -5208,12 +5125,12 @@
         </p:grpSpPr>
         <p:sp>
           <p:nvSpPr>
-            <p:cNvPr name="Freeform 7" id="7"/>
+            <p:cNvPr id="7" name="Freeform 7"/>
             <p:cNvSpPr/>
             <p:nvPr/>
           </p:nvSpPr>
           <p:spPr>
-            <a:xfrm flipH="false" flipV="false" rot="0">
+            <a:xfrm>
               <a:off x="0" y="0"/>
               <a:ext cx="48567" cy="849821"/>
             </a:xfrm>
@@ -5222,9 +5139,9 @@
               <a:gdLst/>
               <a:ahLst/>
               <a:cxnLst/>
-              <a:rect r="r" b="b" t="t" l="l"/>
+              <a:rect l="l" t="t" r="r" b="b"/>
               <a:pathLst>
-                <a:path h="849821" w="48567">
+                <a:path w="48567" h="849821">
                   <a:moveTo>
                     <a:pt x="0" y="0"/>
                   </a:moveTo>
@@ -5253,8 +5170,8 @@
         </p:sp>
         <p:sp>
           <p:nvSpPr>
-            <p:cNvPr name="TextBox 8" id="8"/>
-            <p:cNvSpPr txBox="true"/>
+            <p:cNvPr id="8" name="TextBox 8"/>
+            <p:cNvSpPr txBox="1"/>
             <p:nvPr/>
           </p:nvSpPr>
           <p:spPr>
@@ -5267,7 +5184,7 @@
             </a:prstGeom>
           </p:spPr>
           <p:txBody>
-            <a:bodyPr anchor="ctr" rtlCol="false" tIns="50800" lIns="50800" bIns="50800" rIns="50800"/>
+            <a:bodyPr lIns="50800" tIns="50800" rIns="50800" bIns="50800" rtlCol="0" anchor="ctr"/>
             <a:lstStyle/>
             <a:p>
               <a:pPr algn="ctr">
@@ -5275,18 +5192,19 @@
                   <a:spcPts val="2659"/>
                 </a:lnSpc>
               </a:pPr>
+              <a:endParaRPr/>
             </a:p>
           </p:txBody>
         </p:sp>
       </p:grpSp>
       <p:sp>
         <p:nvSpPr>
-          <p:cNvPr name="Freeform 9" id="9"/>
+          <p:cNvPr id="9" name="Freeform 9"/>
           <p:cNvSpPr/>
           <p:nvPr/>
         </p:nvSpPr>
         <p:spPr>
-          <a:xfrm flipH="false" flipV="false" rot="-4312179">
+          <a:xfrm rot="-4312179">
             <a:off x="8431110" y="1994795"/>
             <a:ext cx="684763" cy="555514"/>
           </a:xfrm>
@@ -5295,9 +5213,9 @@
             <a:gdLst/>
             <a:ahLst/>
             <a:cxnLst/>
-            <a:rect r="r" b="b" t="t" l="l"/>
+            <a:rect l="l" t="t" r="r" b="b"/>
             <a:pathLst>
-              <a:path h="555514" w="684763">
+              <a:path w="684763" h="555514">
                 <a:moveTo>
                   <a:pt x="0" y="0"/>
                 </a:moveTo>
@@ -5326,19 +5244,19 @@
               </a:extLst>
             </a:blip>
             <a:stretch>
-              <a:fillRect l="0" t="0" r="0" b="0"/>
+              <a:fillRect/>
             </a:stretch>
           </a:blipFill>
         </p:spPr>
       </p:sp>
       <p:sp>
         <p:nvSpPr>
-          <p:cNvPr name="Freeform 10" id="10"/>
+          <p:cNvPr id="10" name="Freeform 10"/>
           <p:cNvSpPr/>
           <p:nvPr/>
         </p:nvSpPr>
         <p:spPr>
-          <a:xfrm flipH="false" flipV="false" rot="0">
+          <a:xfrm>
             <a:off x="1066800" y="586294"/>
             <a:ext cx="884811" cy="884811"/>
           </a:xfrm>
@@ -5347,9 +5265,9 @@
             <a:gdLst/>
             <a:ahLst/>
             <a:cxnLst/>
-            <a:rect r="r" b="b" t="t" l="l"/>
+            <a:rect l="l" t="t" r="r" b="b"/>
             <a:pathLst>
-              <a:path h="884811" w="884811">
+              <a:path w="884811" h="884811">
                 <a:moveTo>
                   <a:pt x="0" y="0"/>
                 </a:moveTo>
@@ -5372,19 +5290,19 @@
           <a:blipFill>
             <a:blip r:embed="rId4"/>
             <a:stretch>
-              <a:fillRect l="0" t="0" r="0" b="0"/>
+              <a:fillRect/>
             </a:stretch>
           </a:blipFill>
         </p:spPr>
       </p:sp>
       <p:sp>
         <p:nvSpPr>
-          <p:cNvPr name="Freeform 11" id="11"/>
+          <p:cNvPr id="11" name="Freeform 11"/>
           <p:cNvSpPr/>
           <p:nvPr/>
         </p:nvSpPr>
         <p:spPr>
-          <a:xfrm flipH="false" flipV="false" rot="0">
+          <a:xfrm>
             <a:off x="9144000" y="552672"/>
             <a:ext cx="9144000" cy="9637945"/>
           </a:xfrm>
@@ -5393,9 +5311,9 @@
             <a:gdLst/>
             <a:ahLst/>
             <a:cxnLst/>
-            <a:rect r="r" b="b" t="t" l="l"/>
+            <a:rect l="l" t="t" r="r" b="b"/>
             <a:pathLst>
-              <a:path h="9637945" w="9144000">
+              <a:path w="9144000" h="9637945">
                 <a:moveTo>
                   <a:pt x="0" y="0"/>
                 </a:moveTo>
@@ -5424,19 +5342,19 @@
               </a:extLst>
             </a:blip>
             <a:stretch>
-              <a:fillRect l="0" t="0" r="0" b="0"/>
+              <a:fillRect/>
             </a:stretch>
           </a:blipFill>
         </p:spPr>
       </p:sp>
       <p:sp>
         <p:nvSpPr>
-          <p:cNvPr name="Freeform 12" id="12"/>
+          <p:cNvPr id="12" name="Freeform 12"/>
           <p:cNvSpPr/>
           <p:nvPr/>
         </p:nvSpPr>
         <p:spPr>
-          <a:xfrm flipH="false" flipV="false" rot="0">
+          <a:xfrm>
             <a:off x="1028700" y="4933213"/>
             <a:ext cx="922911" cy="958869"/>
           </a:xfrm>
@@ -5445,9 +5363,9 @@
             <a:gdLst/>
             <a:ahLst/>
             <a:cxnLst/>
-            <a:rect r="r" b="b" t="t" l="l"/>
+            <a:rect l="l" t="t" r="r" b="b"/>
             <a:pathLst>
-              <a:path h="958869" w="922911">
+              <a:path w="922911" h="958869">
                 <a:moveTo>
                   <a:pt x="0" y="0"/>
                 </a:moveTo>
@@ -5470,19 +5388,19 @@
           <a:blipFill>
             <a:blip r:embed="rId7"/>
             <a:stretch>
-              <a:fillRect l="0" t="0" r="0" b="0"/>
+              <a:fillRect/>
             </a:stretch>
           </a:blipFill>
         </p:spPr>
       </p:sp>
       <p:sp>
         <p:nvSpPr>
-          <p:cNvPr name="TextBox 13" id="13"/>
-          <p:cNvSpPr txBox="true"/>
-          <p:nvPr/>
-        </p:nvSpPr>
-        <p:spPr>
-          <a:xfrm rot="0">
+          <p:cNvPr id="13" name="TextBox 13"/>
+          <p:cNvSpPr txBox="1"/>
+          <p:nvPr/>
+        </p:nvSpPr>
+        <p:spPr>
+          <a:xfrm>
             <a:off x="2254895" y="877912"/>
             <a:ext cx="4593650" cy="339725"/>
           </a:xfrm>
@@ -5491,7 +5409,7 @@
           </a:prstGeom>
         </p:spPr>
         <p:txBody>
-          <a:bodyPr anchor="t" rtlCol="false" tIns="0" lIns="0" bIns="0" rIns="0">
+          <a:bodyPr lIns="0" tIns="0" rIns="0" bIns="0" rtlCol="0" anchor="t">
             <a:spAutoFit/>
           </a:bodyPr>
           <a:lstStyle/>
@@ -5515,12 +5433,12 @@
       </p:sp>
       <p:sp>
         <p:nvSpPr>
-          <p:cNvPr name="TextBox 14" id="14"/>
-          <p:cNvSpPr txBox="true"/>
-          <p:nvPr/>
-        </p:nvSpPr>
-        <p:spPr>
-          <a:xfrm rot="0">
+          <p:cNvPr id="14" name="TextBox 14"/>
+          <p:cNvSpPr txBox="1"/>
+          <p:nvPr/>
+        </p:nvSpPr>
+        <p:spPr>
+          <a:xfrm>
             <a:off x="2254895" y="5123713"/>
             <a:ext cx="2953291" cy="580390"/>
           </a:xfrm>
@@ -5529,7 +5447,7 @@
           </a:prstGeom>
         </p:spPr>
         <p:txBody>
-          <a:bodyPr anchor="t" rtlCol="false" tIns="0" lIns="0" bIns="0" rIns="0">
+          <a:bodyPr lIns="0" tIns="0" rIns="0" bIns="0" rtlCol="0" anchor="t">
             <a:spAutoFit/>
           </a:bodyPr>
           <a:lstStyle/>
@@ -5553,12 +5471,12 @@
       </p:sp>
       <p:sp>
         <p:nvSpPr>
-          <p:cNvPr name="Freeform 15" id="15"/>
+          <p:cNvPr id="15" name="Freeform 15"/>
           <p:cNvSpPr/>
           <p:nvPr/>
         </p:nvSpPr>
         <p:spPr>
-          <a:xfrm flipH="false" flipV="false" rot="0">
+          <a:xfrm>
             <a:off x="1028700" y="6060030"/>
             <a:ext cx="922911" cy="958869"/>
           </a:xfrm>
@@ -5567,9 +5485,9 @@
             <a:gdLst/>
             <a:ahLst/>
             <a:cxnLst/>
-            <a:rect r="r" b="b" t="t" l="l"/>
+            <a:rect l="l" t="t" r="r" b="b"/>
             <a:pathLst>
-              <a:path h="958869" w="922911">
+              <a:path w="922911" h="958869">
                 <a:moveTo>
                   <a:pt x="0" y="0"/>
                 </a:moveTo>
@@ -5592,19 +5510,19 @@
           <a:blipFill>
             <a:blip r:embed="rId7"/>
             <a:stretch>
-              <a:fillRect l="0" t="0" r="0" b="0"/>
+              <a:fillRect/>
             </a:stretch>
           </a:blipFill>
         </p:spPr>
       </p:sp>
       <p:sp>
         <p:nvSpPr>
-          <p:cNvPr name="TextBox 16" id="16"/>
-          <p:cNvSpPr txBox="true"/>
-          <p:nvPr/>
-        </p:nvSpPr>
-        <p:spPr>
-          <a:xfrm rot="0">
+          <p:cNvPr id="16" name="TextBox 16"/>
+          <p:cNvSpPr txBox="1"/>
+          <p:nvPr/>
+        </p:nvSpPr>
+        <p:spPr>
+          <a:xfrm>
             <a:off x="2301819" y="6285128"/>
             <a:ext cx="4841739" cy="580390"/>
           </a:xfrm>
@@ -5613,7 +5531,7 @@
           </a:prstGeom>
         </p:spPr>
         <p:txBody>
-          <a:bodyPr anchor="t" rtlCol="false" tIns="0" lIns="0" bIns="0" rIns="0">
+          <a:bodyPr lIns="0" tIns="0" rIns="0" bIns="0" rtlCol="0" anchor="t">
             <a:spAutoFit/>
           </a:bodyPr>
           <a:lstStyle/>
@@ -5637,12 +5555,12 @@
       </p:sp>
       <p:sp>
         <p:nvSpPr>
-          <p:cNvPr name="Freeform 17" id="17"/>
+          <p:cNvPr id="17" name="Freeform 17"/>
           <p:cNvSpPr/>
           <p:nvPr/>
         </p:nvSpPr>
         <p:spPr>
-          <a:xfrm flipH="false" flipV="false" rot="0">
+          <a:xfrm>
             <a:off x="1028700" y="7190349"/>
             <a:ext cx="922911" cy="958869"/>
           </a:xfrm>
@@ -5651,9 +5569,9 @@
             <a:gdLst/>
             <a:ahLst/>
             <a:cxnLst/>
-            <a:rect r="r" b="b" t="t" l="l"/>
+            <a:rect l="l" t="t" r="r" b="b"/>
             <a:pathLst>
-              <a:path h="958869" w="922911">
+              <a:path w="922911" h="958869">
                 <a:moveTo>
                   <a:pt x="0" y="0"/>
                 </a:moveTo>
@@ -5676,19 +5594,19 @@
           <a:blipFill>
             <a:blip r:embed="rId7"/>
             <a:stretch>
-              <a:fillRect l="0" t="0" r="0" b="0"/>
+              <a:fillRect/>
             </a:stretch>
           </a:blipFill>
         </p:spPr>
       </p:sp>
       <p:sp>
         <p:nvSpPr>
-          <p:cNvPr name="TextBox 18" id="18"/>
-          <p:cNvSpPr txBox="true"/>
-          <p:nvPr/>
-        </p:nvSpPr>
-        <p:spPr>
-          <a:xfrm rot="0">
+          <p:cNvPr id="18" name="TextBox 18"/>
+          <p:cNvSpPr txBox="1"/>
+          <p:nvPr/>
+        </p:nvSpPr>
+        <p:spPr>
+          <a:xfrm>
             <a:off x="2301819" y="7446543"/>
             <a:ext cx="5024492" cy="580390"/>
           </a:xfrm>
@@ -5697,7 +5615,7 @@
           </a:prstGeom>
         </p:spPr>
         <p:txBody>
-          <a:bodyPr anchor="t" rtlCol="false" tIns="0" lIns="0" bIns="0" rIns="0">
+          <a:bodyPr lIns="0" tIns="0" rIns="0" bIns="0" rtlCol="0" anchor="t">
             <a:spAutoFit/>
           </a:bodyPr>
           <a:lstStyle/>
@@ -5721,12 +5639,12 @@
       </p:sp>
       <p:sp>
         <p:nvSpPr>
-          <p:cNvPr name="Freeform 19" id="19"/>
+          <p:cNvPr id="19" name="Freeform 19"/>
           <p:cNvSpPr/>
           <p:nvPr/>
         </p:nvSpPr>
         <p:spPr>
-          <a:xfrm flipH="false" flipV="false" rot="0">
+          <a:xfrm>
             <a:off x="1066800" y="8539743"/>
             <a:ext cx="922911" cy="958869"/>
           </a:xfrm>
@@ -5735,9 +5653,9 @@
             <a:gdLst/>
             <a:ahLst/>
             <a:cxnLst/>
-            <a:rect r="r" b="b" t="t" l="l"/>
+            <a:rect l="l" t="t" r="r" b="b"/>
             <a:pathLst>
-              <a:path h="958869" w="922911">
+              <a:path w="922911" h="958869">
                 <a:moveTo>
                   <a:pt x="0" y="0"/>
                 </a:moveTo>
@@ -5760,19 +5678,19 @@
           <a:blipFill>
             <a:blip r:embed="rId7"/>
             <a:stretch>
-              <a:fillRect l="0" t="0" r="0" b="0"/>
+              <a:fillRect/>
             </a:stretch>
           </a:blipFill>
         </p:spPr>
       </p:sp>
       <p:sp>
         <p:nvSpPr>
-          <p:cNvPr name="TextBox 20" id="20"/>
-          <p:cNvSpPr txBox="true"/>
-          <p:nvPr/>
-        </p:nvSpPr>
-        <p:spPr>
-          <a:xfrm rot="0">
+          <p:cNvPr id="20" name="TextBox 20"/>
+          <p:cNvSpPr txBox="1"/>
+          <p:nvPr/>
+        </p:nvSpPr>
+        <p:spPr>
+          <a:xfrm>
             <a:off x="2301819" y="8695644"/>
             <a:ext cx="5329081" cy="580390"/>
           </a:xfrm>
@@ -5781,7 +5699,7 @@
           </a:prstGeom>
         </p:spPr>
         <p:txBody>
-          <a:bodyPr anchor="t" rtlCol="false" tIns="0" lIns="0" bIns="0" rIns="0">
+          <a:bodyPr lIns="0" tIns="0" rIns="0" bIns="0" rtlCol="0" anchor="t">
             <a:spAutoFit/>
           </a:bodyPr>
           <a:lstStyle/>
@@ -5812,7 +5730,7 @@
 </file>
 
 <file path=ppt/slides/slide6.xml><?xml version="1.0" encoding="utf-8"?>
-<p:sld xmlns:p="http://schemas.openxmlformats.org/presentationml/2006/main" xmlns:a="http://schemas.openxmlformats.org/drawingml/2006/main" xmlns:r="http://schemas.openxmlformats.org/officeDocument/2006/relationships">
+<p:sld xmlns:a="http://schemas.openxmlformats.org/drawingml/2006/main" xmlns:r="http://schemas.openxmlformats.org/officeDocument/2006/relationships" xmlns:p="http://schemas.openxmlformats.org/presentationml/2006/main">
   <p:cSld>
     <p:spTree>
       <p:nvGrpSpPr>
@@ -5830,12 +5748,12 @@
       </p:grpSpPr>
       <p:sp>
         <p:nvSpPr>
-          <p:cNvPr name="Freeform 2" id="2"/>
+          <p:cNvPr id="2" name="Freeform 2"/>
           <p:cNvSpPr/>
           <p:nvPr/>
         </p:nvSpPr>
         <p:spPr>
-          <a:xfrm flipH="false" flipV="false" rot="0">
+          <a:xfrm>
             <a:off x="-1294913" y="-2346358"/>
             <a:ext cx="4352438" cy="4114800"/>
           </a:xfrm>
@@ -5844,9 +5762,9 @@
             <a:gdLst/>
             <a:ahLst/>
             <a:cxnLst/>
-            <a:rect r="r" b="b" t="t" l="l"/>
+            <a:rect l="l" t="t" r="r" b="b"/>
             <a:pathLst>
-              <a:path h="4114800" w="4352438">
+              <a:path w="4352438" h="4114800">
                 <a:moveTo>
                   <a:pt x="0" y="0"/>
                 </a:moveTo>
@@ -5875,19 +5793,19 @@
               </a:extLst>
             </a:blip>
             <a:stretch>
-              <a:fillRect l="0" t="0" r="0" b="0"/>
+              <a:fillRect/>
             </a:stretch>
           </a:blipFill>
         </p:spPr>
       </p:sp>
       <p:sp>
         <p:nvSpPr>
-          <p:cNvPr name="Freeform 3" id="3"/>
+          <p:cNvPr id="3" name="Freeform 3"/>
           <p:cNvSpPr/>
           <p:nvPr/>
         </p:nvSpPr>
         <p:spPr>
-          <a:xfrm flipH="false" flipV="true" rot="0">
+          <a:xfrm flipV="1">
             <a:off x="-1294913" y="8516340"/>
             <a:ext cx="4352438" cy="4114800"/>
           </a:xfrm>
@@ -5896,9 +5814,9 @@
             <a:gdLst/>
             <a:ahLst/>
             <a:cxnLst/>
-            <a:rect r="r" b="b" t="t" l="l"/>
+            <a:rect l="l" t="t" r="r" b="b"/>
             <a:pathLst>
-              <a:path h="4114800" w="4352438">
+              <a:path w="4352438" h="4114800">
                 <a:moveTo>
                   <a:pt x="0" y="4114800"/>
                 </a:moveTo>
@@ -5927,19 +5845,19 @@
               </a:extLst>
             </a:blip>
             <a:stretch>
-              <a:fillRect l="0" t="0" r="0" b="0"/>
+              <a:fillRect/>
             </a:stretch>
           </a:blipFill>
         </p:spPr>
       </p:sp>
       <p:sp>
         <p:nvSpPr>
-          <p:cNvPr name="Freeform 4" id="4"/>
+          <p:cNvPr id="4" name="Freeform 4"/>
           <p:cNvSpPr/>
           <p:nvPr/>
         </p:nvSpPr>
         <p:spPr>
-          <a:xfrm flipH="true" flipV="false" rot="0">
+          <a:xfrm flipH="1">
             <a:off x="15227984" y="-2346358"/>
             <a:ext cx="4352438" cy="4114800"/>
           </a:xfrm>
@@ -5948,9 +5866,9 @@
             <a:gdLst/>
             <a:ahLst/>
             <a:cxnLst/>
-            <a:rect r="r" b="b" t="t" l="l"/>
+            <a:rect l="l" t="t" r="r" b="b"/>
             <a:pathLst>
-              <a:path h="4114800" w="4352438">
+              <a:path w="4352438" h="4114800">
                 <a:moveTo>
                   <a:pt x="4352438" y="0"/>
                 </a:moveTo>
@@ -5979,19 +5897,19 @@
               </a:extLst>
             </a:blip>
             <a:stretch>
-              <a:fillRect l="0" t="0" r="0" b="0"/>
+              <a:fillRect/>
             </a:stretch>
           </a:blipFill>
         </p:spPr>
       </p:sp>
       <p:sp>
         <p:nvSpPr>
-          <p:cNvPr name="Freeform 5" id="5"/>
+          <p:cNvPr id="5" name="Freeform 5"/>
           <p:cNvSpPr/>
           <p:nvPr/>
         </p:nvSpPr>
         <p:spPr>
-          <a:xfrm flipH="true" flipV="true" rot="0">
+          <a:xfrm flipH="1" flipV="1">
             <a:off x="15227984" y="8516340"/>
             <a:ext cx="4352438" cy="4114800"/>
           </a:xfrm>
@@ -6000,9 +5918,9 @@
             <a:gdLst/>
             <a:ahLst/>
             <a:cxnLst/>
-            <a:rect r="r" b="b" t="t" l="l"/>
+            <a:rect l="l" t="t" r="r" b="b"/>
             <a:pathLst>
-              <a:path h="4114800" w="4352438">
+              <a:path w="4352438" h="4114800">
                 <a:moveTo>
                   <a:pt x="4352438" y="4114800"/>
                 </a:moveTo>
@@ -6031,19 +5949,19 @@
               </a:extLst>
             </a:blip>
             <a:stretch>
-              <a:fillRect l="0" t="0" r="0" b="0"/>
+              <a:fillRect/>
             </a:stretch>
           </a:blipFill>
         </p:spPr>
       </p:sp>
       <p:sp>
         <p:nvSpPr>
-          <p:cNvPr name="Freeform 6" id="6"/>
+          <p:cNvPr id="6" name="Freeform 6"/>
           <p:cNvSpPr/>
           <p:nvPr/>
         </p:nvSpPr>
         <p:spPr>
-          <a:xfrm flipH="false" flipV="false" rot="0">
+          <a:xfrm>
             <a:off x="1028700" y="839787"/>
             <a:ext cx="884811" cy="884811"/>
           </a:xfrm>
@@ -6052,9 +5970,9 @@
             <a:gdLst/>
             <a:ahLst/>
             <a:cxnLst/>
-            <a:rect r="r" b="b" t="t" l="l"/>
+            <a:rect l="l" t="t" r="r" b="b"/>
             <a:pathLst>
-              <a:path h="884811" w="884811">
+              <a:path w="884811" h="884811">
                 <a:moveTo>
                   <a:pt x="0" y="0"/>
                 </a:moveTo>
@@ -6077,19 +5995,19 @@
           <a:blipFill>
             <a:blip r:embed="rId4"/>
             <a:stretch>
-              <a:fillRect l="0" t="0" r="0" b="0"/>
+              <a:fillRect/>
             </a:stretch>
           </a:blipFill>
         </p:spPr>
       </p:sp>
       <p:sp>
         <p:nvSpPr>
-          <p:cNvPr name="Freeform 7" id="7"/>
+          <p:cNvPr id="7" name="Freeform 7"/>
           <p:cNvSpPr/>
           <p:nvPr/>
         </p:nvSpPr>
         <p:spPr>
-          <a:xfrm flipH="false" flipV="false" rot="0">
+          <a:xfrm>
             <a:off x="1028700" y="3322411"/>
             <a:ext cx="1134818" cy="1063892"/>
           </a:xfrm>
@@ -6098,9 +6016,9 @@
             <a:gdLst/>
             <a:ahLst/>
             <a:cxnLst/>
-            <a:rect r="r" b="b" t="t" l="l"/>
+            <a:rect l="l" t="t" r="r" b="b"/>
             <a:pathLst>
-              <a:path h="1063892" w="1134818">
+              <a:path w="1134818" h="1063892">
                 <a:moveTo>
                   <a:pt x="0" y="0"/>
                 </a:moveTo>
@@ -6129,19 +6047,19 @@
               </a:extLst>
             </a:blip>
             <a:stretch>
-              <a:fillRect l="0" t="0" r="0" b="0"/>
+              <a:fillRect/>
             </a:stretch>
           </a:blipFill>
         </p:spPr>
       </p:sp>
       <p:sp>
         <p:nvSpPr>
-          <p:cNvPr name="TextBox 8" id="8"/>
-          <p:cNvSpPr txBox="true"/>
-          <p:nvPr/>
-        </p:nvSpPr>
-        <p:spPr>
-          <a:xfrm rot="0">
+          <p:cNvPr id="8" name="TextBox 8"/>
+          <p:cNvSpPr txBox="1"/>
+          <p:nvPr/>
+        </p:nvSpPr>
+        <p:spPr>
+          <a:xfrm>
             <a:off x="2163518" y="1131380"/>
             <a:ext cx="4593650" cy="339725"/>
           </a:xfrm>
@@ -6150,7 +6068,7 @@
           </a:prstGeom>
         </p:spPr>
         <p:txBody>
-          <a:bodyPr anchor="t" rtlCol="false" tIns="0" lIns="0" bIns="0" rIns="0">
+          <a:bodyPr lIns="0" tIns="0" rIns="0" bIns="0" rtlCol="0" anchor="t">
             <a:spAutoFit/>
           </a:bodyPr>
           <a:lstStyle/>
@@ -6174,12 +6092,12 @@
       </p:sp>
       <p:sp>
         <p:nvSpPr>
-          <p:cNvPr name="TextBox 9" id="9"/>
-          <p:cNvSpPr txBox="true"/>
-          <p:nvPr/>
-        </p:nvSpPr>
-        <p:spPr>
-          <a:xfrm rot="0">
+          <p:cNvPr id="9" name="TextBox 9"/>
+          <p:cNvSpPr txBox="1"/>
+          <p:nvPr/>
+        </p:nvSpPr>
+        <p:spPr>
+          <a:xfrm>
             <a:off x="4795390" y="1654142"/>
             <a:ext cx="9645650" cy="1028688"/>
           </a:xfrm>
@@ -6188,7 +6106,7 @@
           </a:prstGeom>
         </p:spPr>
         <p:txBody>
-          <a:bodyPr anchor="t" rtlCol="false" tIns="0" lIns="0" bIns="0" rIns="0">
+          <a:bodyPr lIns="0" tIns="0" rIns="0" bIns="0" rtlCol="0" anchor="t">
             <a:spAutoFit/>
           </a:bodyPr>
           <a:lstStyle/>
@@ -6212,13 +6130,13 @@
       </p:sp>
       <p:sp>
         <p:nvSpPr>
-          <p:cNvPr name="TextBox 10" id="10"/>
-          <p:cNvSpPr txBox="true"/>
-          <p:nvPr/>
-        </p:nvSpPr>
-        <p:spPr>
-          <a:xfrm rot="0">
-            <a:off x="2351326" y="3265261"/>
+          <p:cNvPr id="10" name="TextBox 10"/>
+          <p:cNvSpPr txBox="1"/>
+          <p:nvPr/>
+        </p:nvSpPr>
+        <p:spPr>
+          <a:xfrm>
+            <a:off x="1474980" y="2785755"/>
             <a:ext cx="3190776" cy="514349"/>
           </a:xfrm>
           <a:prstGeom prst="rect">
@@ -6226,7 +6144,7 @@
           </a:prstGeom>
         </p:spPr>
         <p:txBody>
-          <a:bodyPr anchor="t" rtlCol="false" tIns="0" lIns="0" bIns="0" rIns="0">
+          <a:bodyPr lIns="0" tIns="0" rIns="0" bIns="0" rtlCol="0" anchor="t">
             <a:spAutoFit/>
           </a:bodyPr>
           <a:lstStyle/>
@@ -6237,7 +6155,7 @@
               </a:lnSpc>
             </a:pPr>
             <a:r>
-              <a:rPr lang="en-US" sz="3000">
+              <a:rPr lang="en-US" sz="3000" dirty="0">
                 <a:solidFill>
                   <a:srgbClr val="000000"/>
                 </a:solidFill>
@@ -6250,12 +6168,12 @@
       </p:sp>
       <p:sp>
         <p:nvSpPr>
-          <p:cNvPr name="TextBox 11" id="11"/>
-          <p:cNvSpPr txBox="true"/>
-          <p:nvPr/>
-        </p:nvSpPr>
-        <p:spPr>
-          <a:xfrm rot="0">
+          <p:cNvPr id="11" name="TextBox 11"/>
+          <p:cNvSpPr txBox="1"/>
+          <p:nvPr/>
+        </p:nvSpPr>
+        <p:spPr>
+          <a:xfrm>
             <a:off x="2163518" y="3806732"/>
             <a:ext cx="6757168" cy="1406523"/>
           </a:xfrm>
@@ -6264,7 +6182,7 @@
           </a:prstGeom>
         </p:spPr>
         <p:txBody>
-          <a:bodyPr anchor="t" rtlCol="false" tIns="0" lIns="0" bIns="0" rIns="0">
+          <a:bodyPr lIns="0" tIns="0" rIns="0" bIns="0" rtlCol="0" anchor="t">
             <a:spAutoFit/>
           </a:bodyPr>
           <a:lstStyle/>
@@ -6275,7 +6193,7 @@
               </a:lnSpc>
             </a:pPr>
             <a:r>
-              <a:rPr lang="en-US" sz="2000">
+              <a:rPr lang="en-US" sz="2000" dirty="0">
                 <a:solidFill>
                   <a:srgbClr val="000000"/>
                 </a:solidFill>
@@ -6288,12 +6206,12 @@
       </p:sp>
       <p:sp>
         <p:nvSpPr>
-          <p:cNvPr name="Freeform 12" id="12"/>
+          <p:cNvPr id="12" name="Freeform 12"/>
           <p:cNvSpPr/>
           <p:nvPr/>
         </p:nvSpPr>
         <p:spPr>
-          <a:xfrm flipH="false" flipV="false" rot="0">
+          <a:xfrm>
             <a:off x="1028700" y="5919375"/>
             <a:ext cx="1134818" cy="1063892"/>
           </a:xfrm>
@@ -6302,9 +6220,9 @@
             <a:gdLst/>
             <a:ahLst/>
             <a:cxnLst/>
-            <a:rect r="r" b="b" t="t" l="l"/>
+            <a:rect l="l" t="t" r="r" b="b"/>
             <a:pathLst>
-              <a:path h="1063892" w="1134818">
+              <a:path w="1134818" h="1063892">
                 <a:moveTo>
                   <a:pt x="0" y="0"/>
                 </a:moveTo>
@@ -6333,19 +6251,19 @@
               </a:extLst>
             </a:blip>
             <a:stretch>
-              <a:fillRect l="0" t="0" r="0" b="0"/>
+              <a:fillRect/>
             </a:stretch>
           </a:blipFill>
         </p:spPr>
       </p:sp>
       <p:sp>
         <p:nvSpPr>
-          <p:cNvPr name="TextBox 13" id="13"/>
-          <p:cNvSpPr txBox="true"/>
-          <p:nvPr/>
-        </p:nvSpPr>
-        <p:spPr>
-          <a:xfrm rot="0">
+          <p:cNvPr id="13" name="TextBox 13"/>
+          <p:cNvSpPr txBox="1"/>
+          <p:nvPr/>
+        </p:nvSpPr>
+        <p:spPr>
+          <a:xfrm>
             <a:off x="2391460" y="5862225"/>
             <a:ext cx="3110508" cy="514349"/>
           </a:xfrm>
@@ -6354,7 +6272,7 @@
           </a:prstGeom>
         </p:spPr>
         <p:txBody>
-          <a:bodyPr anchor="t" rtlCol="false" tIns="0" lIns="0" bIns="0" rIns="0">
+          <a:bodyPr lIns="0" tIns="0" rIns="0" bIns="0" rtlCol="0" anchor="t">
             <a:spAutoFit/>
           </a:bodyPr>
           <a:lstStyle/>
@@ -6378,12 +6296,12 @@
       </p:sp>
       <p:sp>
         <p:nvSpPr>
-          <p:cNvPr name="TextBox 14" id="14"/>
-          <p:cNvSpPr txBox="true"/>
-          <p:nvPr/>
-        </p:nvSpPr>
-        <p:spPr>
-          <a:xfrm rot="0">
+          <p:cNvPr id="14" name="TextBox 14"/>
+          <p:cNvSpPr txBox="1"/>
+          <p:nvPr/>
+        </p:nvSpPr>
+        <p:spPr>
+          <a:xfrm>
             <a:off x="2163518" y="6403696"/>
             <a:ext cx="6757168" cy="1406523"/>
           </a:xfrm>
@@ -6392,7 +6310,7 @@
           </a:prstGeom>
         </p:spPr>
         <p:txBody>
-          <a:bodyPr anchor="t" rtlCol="false" tIns="0" lIns="0" bIns="0" rIns="0">
+          <a:bodyPr lIns="0" tIns="0" rIns="0" bIns="0" rtlCol="0" anchor="t">
             <a:spAutoFit/>
           </a:bodyPr>
           <a:lstStyle/>
@@ -6416,12 +6334,12 @@
       </p:sp>
       <p:sp>
         <p:nvSpPr>
-          <p:cNvPr name="Freeform 15" id="15"/>
+          <p:cNvPr id="15" name="Freeform 15"/>
           <p:cNvSpPr/>
           <p:nvPr/>
         </p:nvSpPr>
         <p:spPr>
-          <a:xfrm flipH="false" flipV="false" rot="0">
+          <a:xfrm>
             <a:off x="10044624" y="3322411"/>
             <a:ext cx="1134818" cy="1063892"/>
           </a:xfrm>
@@ -6430,9 +6348,9 @@
             <a:gdLst/>
             <a:ahLst/>
             <a:cxnLst/>
-            <a:rect r="r" b="b" t="t" l="l"/>
+            <a:rect l="l" t="t" r="r" b="b"/>
             <a:pathLst>
-              <a:path h="1063892" w="1134818">
+              <a:path w="1134818" h="1063892">
                 <a:moveTo>
                   <a:pt x="0" y="0"/>
                 </a:moveTo>
@@ -6461,19 +6379,19 @@
               </a:extLst>
             </a:blip>
             <a:stretch>
-              <a:fillRect l="0" t="0" r="0" b="0"/>
+              <a:fillRect/>
             </a:stretch>
           </a:blipFill>
         </p:spPr>
       </p:sp>
       <p:sp>
         <p:nvSpPr>
-          <p:cNvPr name="TextBox 16" id="16"/>
-          <p:cNvSpPr txBox="true"/>
-          <p:nvPr/>
-        </p:nvSpPr>
-        <p:spPr>
-          <a:xfrm rot="0">
+          <p:cNvPr id="16" name="TextBox 16"/>
+          <p:cNvSpPr txBox="1"/>
+          <p:nvPr/>
+        </p:nvSpPr>
+        <p:spPr>
+          <a:xfrm>
             <a:off x="11463195" y="3265261"/>
             <a:ext cx="2998887" cy="514349"/>
           </a:xfrm>
@@ -6482,7 +6400,7 @@
           </a:prstGeom>
         </p:spPr>
         <p:txBody>
-          <a:bodyPr anchor="t" rtlCol="false" tIns="0" lIns="0" bIns="0" rIns="0">
+          <a:bodyPr lIns="0" tIns="0" rIns="0" bIns="0" rtlCol="0" anchor="t">
             <a:spAutoFit/>
           </a:bodyPr>
           <a:lstStyle/>
@@ -6506,12 +6424,12 @@
       </p:sp>
       <p:sp>
         <p:nvSpPr>
-          <p:cNvPr name="TextBox 17" id="17"/>
-          <p:cNvSpPr txBox="true"/>
-          <p:nvPr/>
-        </p:nvSpPr>
-        <p:spPr>
-          <a:xfrm rot="0">
+          <p:cNvPr id="17" name="TextBox 17"/>
+          <p:cNvSpPr txBox="1"/>
+          <p:nvPr/>
+        </p:nvSpPr>
+        <p:spPr>
+          <a:xfrm>
             <a:off x="11179443" y="3806732"/>
             <a:ext cx="6757168" cy="1406523"/>
           </a:xfrm>
@@ -6520,7 +6438,7 @@
           </a:prstGeom>
         </p:spPr>
         <p:txBody>
-          <a:bodyPr anchor="t" rtlCol="false" tIns="0" lIns="0" bIns="0" rIns="0">
+          <a:bodyPr lIns="0" tIns="0" rIns="0" bIns="0" rtlCol="0" anchor="t">
             <a:spAutoFit/>
           </a:bodyPr>
           <a:lstStyle/>
@@ -6544,12 +6462,12 @@
       </p:sp>
       <p:sp>
         <p:nvSpPr>
-          <p:cNvPr name="Freeform 18" id="18"/>
+          <p:cNvPr id="18" name="Freeform 18"/>
           <p:cNvSpPr/>
           <p:nvPr/>
         </p:nvSpPr>
         <p:spPr>
-          <a:xfrm flipH="false" flipV="false" rot="0">
+          <a:xfrm>
             <a:off x="10044624" y="6147975"/>
             <a:ext cx="1134818" cy="1063892"/>
           </a:xfrm>
@@ -6558,9 +6476,9 @@
             <a:gdLst/>
             <a:ahLst/>
             <a:cxnLst/>
-            <a:rect r="r" b="b" t="t" l="l"/>
+            <a:rect l="l" t="t" r="r" b="b"/>
             <a:pathLst>
-              <a:path h="1063892" w="1134818">
+              <a:path w="1134818" h="1063892">
                 <a:moveTo>
                   <a:pt x="0" y="0"/>
                 </a:moveTo>
@@ -6589,19 +6507,19 @@
               </a:extLst>
             </a:blip>
             <a:stretch>
-              <a:fillRect l="0" t="0" r="0" b="0"/>
+              <a:fillRect/>
             </a:stretch>
           </a:blipFill>
         </p:spPr>
       </p:sp>
       <p:sp>
         <p:nvSpPr>
-          <p:cNvPr name="TextBox 19" id="19"/>
-          <p:cNvSpPr txBox="true"/>
-          <p:nvPr/>
-        </p:nvSpPr>
-        <p:spPr>
-          <a:xfrm rot="0">
+          <p:cNvPr id="19" name="TextBox 19"/>
+          <p:cNvSpPr txBox="1"/>
+          <p:nvPr/>
+        </p:nvSpPr>
+        <p:spPr>
+          <a:xfrm>
             <a:off x="11408043" y="6090825"/>
             <a:ext cx="1825625" cy="514349"/>
           </a:xfrm>
@@ -6610,7 +6528,7 @@
           </a:prstGeom>
         </p:spPr>
         <p:txBody>
-          <a:bodyPr anchor="t" rtlCol="false" tIns="0" lIns="0" bIns="0" rIns="0">
+          <a:bodyPr lIns="0" tIns="0" rIns="0" bIns="0" rtlCol="0" anchor="t">
             <a:spAutoFit/>
           </a:bodyPr>
           <a:lstStyle/>
@@ -6634,12 +6552,12 @@
       </p:sp>
       <p:sp>
         <p:nvSpPr>
-          <p:cNvPr name="TextBox 20" id="20"/>
-          <p:cNvSpPr txBox="true"/>
-          <p:nvPr/>
-        </p:nvSpPr>
-        <p:spPr>
-          <a:xfrm rot="0">
+          <p:cNvPr id="20" name="TextBox 20"/>
+          <p:cNvSpPr txBox="1"/>
+          <p:nvPr/>
+        </p:nvSpPr>
+        <p:spPr>
+          <a:xfrm>
             <a:off x="11179443" y="6632296"/>
             <a:ext cx="6757168" cy="1054098"/>
           </a:xfrm>
@@ -6648,7 +6566,7 @@
           </a:prstGeom>
         </p:spPr>
         <p:txBody>
-          <a:bodyPr anchor="t" rtlCol="false" tIns="0" lIns="0" bIns="0" rIns="0">
+          <a:bodyPr lIns="0" tIns="0" rIns="0" bIns="0" rtlCol="0" anchor="t">
             <a:spAutoFit/>
           </a:bodyPr>
           <a:lstStyle/>
@@ -6679,7 +6597,7 @@
 </file>
 
 <file path=ppt/slides/slide7.xml><?xml version="1.0" encoding="utf-8"?>
-<p:sld xmlns:p="http://schemas.openxmlformats.org/presentationml/2006/main" xmlns:a="http://schemas.openxmlformats.org/drawingml/2006/main" xmlns:r="http://schemas.openxmlformats.org/officeDocument/2006/relationships">
+<p:sld xmlns:a="http://schemas.openxmlformats.org/drawingml/2006/main" xmlns:r="http://schemas.openxmlformats.org/officeDocument/2006/relationships" xmlns:p="http://schemas.openxmlformats.org/presentationml/2006/main">
   <p:cSld>
     <p:spTree>
       <p:nvGrpSpPr>
@@ -6697,12 +6615,12 @@
       </p:grpSpPr>
       <p:sp>
         <p:nvSpPr>
-          <p:cNvPr name="Freeform 2" id="2"/>
+          <p:cNvPr id="2" name="Freeform 2"/>
           <p:cNvSpPr/>
           <p:nvPr/>
         </p:nvSpPr>
         <p:spPr>
-          <a:xfrm flipH="true" flipV="false" rot="1199409">
+          <a:xfrm rot="1199409" flipH="1">
             <a:off x="-5783220" y="-358988"/>
             <a:ext cx="16730850" cy="15817366"/>
           </a:xfrm>
@@ -6711,9 +6629,9 @@
             <a:gdLst/>
             <a:ahLst/>
             <a:cxnLst/>
-            <a:rect r="r" b="b" t="t" l="l"/>
+            <a:rect l="l" t="t" r="r" b="b"/>
             <a:pathLst>
-              <a:path h="15817366" w="16730850">
+              <a:path w="16730850" h="15817366">
                 <a:moveTo>
                   <a:pt x="16730850" y="0"/>
                 </a:moveTo>
@@ -6742,19 +6660,19 @@
               </a:extLst>
             </a:blip>
             <a:stretch>
-              <a:fillRect l="0" t="0" r="0" b="0"/>
+              <a:fillRect/>
             </a:stretch>
           </a:blipFill>
         </p:spPr>
       </p:sp>
       <p:grpSp>
         <p:nvGrpSpPr>
-          <p:cNvPr name="Group 3" id="3"/>
+          <p:cNvPr id="3" name="Group 3"/>
           <p:cNvGrpSpPr/>
           <p:nvPr/>
         </p:nvGrpSpPr>
         <p:grpSpPr>
-          <a:xfrm rot="0">
+          <a:xfrm>
             <a:off x="17984450" y="-167940"/>
             <a:ext cx="607099" cy="10622880"/>
             <a:chOff x="0" y="0"/>
@@ -6763,12 +6681,12 @@
         </p:grpSpPr>
         <p:sp>
           <p:nvSpPr>
-            <p:cNvPr name="Freeform 4" id="4"/>
+            <p:cNvPr id="4" name="Freeform 4"/>
             <p:cNvSpPr/>
             <p:nvPr/>
           </p:nvSpPr>
           <p:spPr>
-            <a:xfrm flipH="false" flipV="false" rot="0">
+            <a:xfrm>
               <a:off x="0" y="0"/>
               <a:ext cx="48567" cy="849821"/>
             </a:xfrm>
@@ -6777,9 +6695,9 @@
               <a:gdLst/>
               <a:ahLst/>
               <a:cxnLst/>
-              <a:rect r="r" b="b" t="t" l="l"/>
+              <a:rect l="l" t="t" r="r" b="b"/>
               <a:pathLst>
-                <a:path h="849821" w="48567">
+                <a:path w="48567" h="849821">
                   <a:moveTo>
                     <a:pt x="0" y="0"/>
                   </a:moveTo>
@@ -6808,8 +6726,8 @@
         </p:sp>
         <p:sp>
           <p:nvSpPr>
-            <p:cNvPr name="TextBox 5" id="5"/>
-            <p:cNvSpPr txBox="true"/>
+            <p:cNvPr id="5" name="TextBox 5"/>
+            <p:cNvSpPr txBox="1"/>
             <p:nvPr/>
           </p:nvSpPr>
           <p:spPr>
@@ -6822,7 +6740,7 @@
             </a:prstGeom>
           </p:spPr>
           <p:txBody>
-            <a:bodyPr anchor="ctr" rtlCol="false" tIns="50800" lIns="50800" bIns="50800" rIns="50800"/>
+            <a:bodyPr lIns="50800" tIns="50800" rIns="50800" bIns="50800" rtlCol="0" anchor="ctr"/>
             <a:lstStyle/>
             <a:p>
               <a:pPr algn="ctr">
@@ -6830,18 +6748,19 @@
                   <a:spcPts val="2659"/>
                 </a:lnSpc>
               </a:pPr>
+              <a:endParaRPr/>
             </a:p>
           </p:txBody>
         </p:sp>
       </p:grpSp>
       <p:grpSp>
         <p:nvGrpSpPr>
-          <p:cNvPr name="Group 6" id="6"/>
+          <p:cNvPr id="6" name="Group 6"/>
           <p:cNvGrpSpPr/>
           <p:nvPr/>
         </p:nvGrpSpPr>
         <p:grpSpPr>
-          <a:xfrm rot="0">
+          <a:xfrm>
             <a:off x="8827433" y="7295324"/>
             <a:ext cx="9968272" cy="1962976"/>
             <a:chOff x="0" y="0"/>
@@ -6850,12 +6769,12 @@
         </p:grpSpPr>
         <p:sp>
           <p:nvSpPr>
-            <p:cNvPr name="Freeform 7" id="7"/>
+            <p:cNvPr id="7" name="Freeform 7"/>
             <p:cNvSpPr/>
             <p:nvPr/>
           </p:nvSpPr>
           <p:spPr>
-            <a:xfrm flipH="false" flipV="false" rot="0">
+            <a:xfrm>
               <a:off x="0" y="0"/>
               <a:ext cx="797453" cy="157036"/>
             </a:xfrm>
@@ -6864,9 +6783,9 @@
               <a:gdLst/>
               <a:ahLst/>
               <a:cxnLst/>
-              <a:rect r="r" b="b" t="t" l="l"/>
+              <a:rect l="l" t="t" r="r" b="b"/>
               <a:pathLst>
-                <a:path h="157036" w="797453">
+                <a:path w="797453" h="157036">
                   <a:moveTo>
                     <a:pt x="32620" y="0"/>
                   </a:moveTo>
@@ -6928,8 +6847,8 @@
         </p:sp>
         <p:sp>
           <p:nvSpPr>
-            <p:cNvPr name="TextBox 8" id="8"/>
-            <p:cNvSpPr txBox="true"/>
+            <p:cNvPr id="8" name="TextBox 8"/>
+            <p:cNvSpPr txBox="1"/>
             <p:nvPr/>
           </p:nvSpPr>
           <p:spPr>
@@ -6942,7 +6861,7 @@
             </a:prstGeom>
           </p:spPr>
           <p:txBody>
-            <a:bodyPr anchor="ctr" rtlCol="false" tIns="50800" lIns="50800" bIns="50800" rIns="50800"/>
+            <a:bodyPr lIns="50800" tIns="50800" rIns="50800" bIns="50800" rtlCol="0" anchor="ctr"/>
             <a:lstStyle/>
             <a:p>
               <a:pPr algn="ctr">
@@ -6950,13 +6869,14 @@
                   <a:spcPts val="2659"/>
                 </a:lnSpc>
               </a:pPr>
+              <a:endParaRPr/>
             </a:p>
           </p:txBody>
         </p:sp>
       </p:grpSp>
       <p:sp>
         <p:nvSpPr>
-          <p:cNvPr name="AutoShape 9" id="9"/>
+          <p:cNvPr id="9" name="AutoShape 9"/>
           <p:cNvSpPr/>
           <p:nvPr/>
         </p:nvSpPr>
@@ -6968,24 +6888,24 @@
           <a:prstGeom prst="line">
             <a:avLst/>
           </a:prstGeom>
-          <a:ln cap="flat" w="38100">
+          <a:ln w="38100" cap="flat">
             <a:solidFill>
               <a:srgbClr val="000000"/>
             </a:solidFill>
             <a:prstDash val="solid"/>
-            <a:headEnd type="none" len="sm" w="sm"/>
-            <a:tailEnd type="none" len="sm" w="sm"/>
+            <a:headEnd type="none" w="sm" len="sm"/>
+            <a:tailEnd type="none" w="sm" len="sm"/>
           </a:ln>
         </p:spPr>
       </p:sp>
       <p:sp>
         <p:nvSpPr>
-          <p:cNvPr name="Freeform 10" id="10"/>
+          <p:cNvPr id="10" name="Freeform 10"/>
           <p:cNvSpPr/>
           <p:nvPr/>
         </p:nvSpPr>
         <p:spPr>
-          <a:xfrm flipH="true" flipV="false" rot="0">
+          <a:xfrm flipH="1">
             <a:off x="1028700" y="1607445"/>
             <a:ext cx="7001389" cy="7072110"/>
           </a:xfrm>
@@ -6994,9 +6914,9 @@
             <a:gdLst/>
             <a:ahLst/>
             <a:cxnLst/>
-            <a:rect r="r" b="b" t="t" l="l"/>
+            <a:rect l="l" t="t" r="r" b="b"/>
             <a:pathLst>
-              <a:path h="7072110" w="7001389">
+              <a:path w="7001389" h="7072110">
                 <a:moveTo>
                   <a:pt x="7001389" y="0"/>
                 </a:moveTo>
@@ -7019,19 +6939,19 @@
           <a:blipFill>
             <a:blip r:embed="rId4"/>
             <a:stretch>
-              <a:fillRect l="0" t="0" r="0" b="0"/>
+              <a:fillRect/>
             </a:stretch>
           </a:blipFill>
         </p:spPr>
       </p:sp>
       <p:sp>
         <p:nvSpPr>
-          <p:cNvPr name="TextBox 11" id="11"/>
-          <p:cNvSpPr txBox="true"/>
-          <p:nvPr/>
-        </p:nvSpPr>
-        <p:spPr>
-          <a:xfrm rot="0">
+          <p:cNvPr id="11" name="TextBox 11"/>
+          <p:cNvSpPr txBox="1"/>
+          <p:nvPr/>
+        </p:nvSpPr>
+        <p:spPr>
+          <a:xfrm>
             <a:off x="8827433" y="2191926"/>
             <a:ext cx="8192074" cy="1237503"/>
           </a:xfrm>
@@ -7040,7 +6960,7 @@
           </a:prstGeom>
         </p:spPr>
         <p:txBody>
-          <a:bodyPr anchor="t" rtlCol="false" tIns="0" lIns="0" bIns="0" rIns="0">
+          <a:bodyPr lIns="0" tIns="0" rIns="0" bIns="0" rtlCol="0" anchor="t">
             <a:spAutoFit/>
           </a:bodyPr>
           <a:lstStyle/>
@@ -7064,12 +6984,12 @@
       </p:sp>
       <p:sp>
         <p:nvSpPr>
-          <p:cNvPr name="TextBox 12" id="12"/>
-          <p:cNvSpPr txBox="true"/>
-          <p:nvPr/>
-        </p:nvSpPr>
-        <p:spPr>
-          <a:xfrm rot="0">
+          <p:cNvPr id="12" name="TextBox 12"/>
+          <p:cNvSpPr txBox="1"/>
+          <p:nvPr/>
+        </p:nvSpPr>
+        <p:spPr>
+          <a:xfrm>
             <a:off x="9144000" y="5201384"/>
             <a:ext cx="6975372" cy="987364"/>
           </a:xfrm>
@@ -7078,7 +6998,7 @@
           </a:prstGeom>
         </p:spPr>
         <p:txBody>
-          <a:bodyPr anchor="t" rtlCol="false" tIns="0" lIns="0" bIns="0" rIns="0">
+          <a:bodyPr lIns="0" tIns="0" rIns="0" bIns="0" rtlCol="0" anchor="t">
             <a:spAutoFit/>
           </a:bodyPr>
           <a:lstStyle/>
@@ -7102,12 +7022,12 @@
       </p:sp>
       <p:sp>
         <p:nvSpPr>
-          <p:cNvPr name="Freeform 13" id="13"/>
+          <p:cNvPr id="13" name="Freeform 13"/>
           <p:cNvSpPr/>
           <p:nvPr/>
         </p:nvSpPr>
         <p:spPr>
-          <a:xfrm flipH="false" flipV="false" rot="5207285">
+          <a:xfrm rot="5207285">
             <a:off x="3643179" y="294677"/>
             <a:ext cx="880590" cy="1657222"/>
           </a:xfrm>
@@ -7116,9 +7036,9 @@
             <a:gdLst/>
             <a:ahLst/>
             <a:cxnLst/>
-            <a:rect r="r" b="b" t="t" l="l"/>
+            <a:rect l="l" t="t" r="r" b="b"/>
             <a:pathLst>
-              <a:path h="1657222" w="880590">
+              <a:path w="880590" h="1657222">
                 <a:moveTo>
                   <a:pt x="0" y="0"/>
                 </a:moveTo>
@@ -7147,19 +7067,19 @@
               </a:extLst>
             </a:blip>
             <a:stretch>
-              <a:fillRect l="0" t="0" r="0" b="0"/>
+              <a:fillRect/>
             </a:stretch>
           </a:blipFill>
         </p:spPr>
       </p:sp>
       <p:sp>
         <p:nvSpPr>
-          <p:cNvPr name="Freeform 14" id="14"/>
+          <p:cNvPr id="14" name="Freeform 14"/>
           <p:cNvSpPr/>
           <p:nvPr/>
         </p:nvSpPr>
         <p:spPr>
-          <a:xfrm flipH="false" flipV="false" rot="0">
+          <a:xfrm>
             <a:off x="8865533" y="724506"/>
             <a:ext cx="884811" cy="884811"/>
           </a:xfrm>
@@ -7168,9 +7088,9 @@
             <a:gdLst/>
             <a:ahLst/>
             <a:cxnLst/>
-            <a:rect r="r" b="b" t="t" l="l"/>
+            <a:rect l="l" t="t" r="r" b="b"/>
             <a:pathLst>
-              <a:path h="884811" w="884811">
+              <a:path w="884811" h="884811">
                 <a:moveTo>
                   <a:pt x="0" y="0"/>
                 </a:moveTo>
@@ -7193,19 +7113,19 @@
           <a:blipFill>
             <a:blip r:embed="rId7"/>
             <a:stretch>
-              <a:fillRect l="0" t="0" r="0" b="0"/>
+              <a:fillRect/>
             </a:stretch>
           </a:blipFill>
         </p:spPr>
       </p:sp>
       <p:sp>
         <p:nvSpPr>
-          <p:cNvPr name="TextBox 15" id="15"/>
-          <p:cNvSpPr txBox="true"/>
-          <p:nvPr/>
-        </p:nvSpPr>
-        <p:spPr>
-          <a:xfrm rot="0">
+          <p:cNvPr id="15" name="TextBox 15"/>
+          <p:cNvSpPr txBox="1"/>
+          <p:nvPr/>
+        </p:nvSpPr>
+        <p:spPr>
+          <a:xfrm>
             <a:off x="10053627" y="1016124"/>
             <a:ext cx="4593650" cy="339725"/>
           </a:xfrm>
@@ -7214,7 +7134,7 @@
           </a:prstGeom>
         </p:spPr>
         <p:txBody>
-          <a:bodyPr anchor="t" rtlCol="false" tIns="0" lIns="0" bIns="0" rIns="0">
+          <a:bodyPr lIns="0" tIns="0" rIns="0" bIns="0" rtlCol="0" anchor="t">
             <a:spAutoFit/>
           </a:bodyPr>
           <a:lstStyle/>
@@ -7238,12 +7158,12 @@
       </p:sp>
       <p:sp>
         <p:nvSpPr>
-          <p:cNvPr name="TextBox 16" id="16"/>
-          <p:cNvSpPr txBox="true"/>
-          <p:nvPr/>
-        </p:nvSpPr>
-        <p:spPr>
-          <a:xfrm rot="0">
+          <p:cNvPr id="16" name="TextBox 16"/>
+          <p:cNvSpPr txBox="1"/>
+          <p:nvPr/>
+        </p:nvSpPr>
+        <p:spPr>
+          <a:xfrm>
             <a:off x="9307938" y="7225918"/>
             <a:ext cx="8676512" cy="1997014"/>
           </a:xfrm>
@@ -7252,7 +7172,7 @@
           </a:prstGeom>
         </p:spPr>
         <p:txBody>
-          <a:bodyPr anchor="t" rtlCol="false" tIns="0" lIns="0" bIns="0" rIns="0">
+          <a:bodyPr lIns="0" tIns="0" rIns="0" bIns="0" rtlCol="0" anchor="t">
             <a:spAutoFit/>
           </a:bodyPr>
           <a:lstStyle/>

</xml_diff>